<commit_message>
Custom Projects:  Added MMC Interfacing and Temperature reading using DS1820
</commit_message>
<xml_diff>
--- a/custom_projects/01_MicroSdCardInterfacing/01_MicroSdCardInterfacing.pptx
+++ b/custom_projects/01_MicroSdCardInterfacing/01_MicroSdCardInterfacing.pptx
@@ -7194,132 +7194,6 @@
           </a:p>
         </p:txBody>
       </p:sp>
-      <p:graphicFrame>
-        <p:nvGraphicFramePr>
-          <p:cNvPr id="3" name="Object 2">
-            <a:extLst>
-              <a:ext uri="{FF2B5EF4-FFF2-40B4-BE49-F238E27FC236}">
-                <a16:creationId xmlns:a16="http://schemas.microsoft.com/office/drawing/2014/main" id="{032925B4-19C2-43B9-B01D-D3279406EAD4}"/>
-              </a:ext>
-            </a:extLst>
-          </p:cNvPr>
-          <p:cNvGraphicFramePr>
-            <a:graphicFrameLocks noChangeAspect="1"/>
-          </p:cNvGraphicFramePr>
-          <p:nvPr>
-            <p:extLst>
-              <p:ext uri="{D42A27DB-BD31-4B8C-83A1-F6EECF244321}">
-                <p14:modId xmlns:p14="http://schemas.microsoft.com/office/powerpoint/2010/main" val="3260279512"/>
-              </p:ext>
-            </p:extLst>
-          </p:nvPr>
-        </p:nvGraphicFramePr>
-        <p:xfrm>
-          <a:off x="685800" y="4399040"/>
-          <a:ext cx="4096948" cy="1694587"/>
-        </p:xfrm>
-        <a:graphic>
-          <a:graphicData uri="http://schemas.openxmlformats.org/presentationml/2006/ole">
-            <mc:AlternateContent xmlns:mc="http://schemas.openxmlformats.org/markup-compatibility/2006">
-              <mc:Choice xmlns:v="urn:schemas-microsoft-com:vml" Requires="v">
-                <p:oleObj spid="_x0000_s1044" name="Packager Shell Object" showAsIcon="1" r:id="rId3" imgW="955800" imgH="394560" progId="Package">
-                  <p:embed/>
-                </p:oleObj>
-              </mc:Choice>
-              <mc:Fallback>
-                <p:oleObj name="Packager Shell Object" showAsIcon="1" r:id="rId3" imgW="955800" imgH="394560" progId="Package">
-                  <p:embed/>
-                  <p:pic>
-                    <p:nvPicPr>
-                      <p:cNvPr id="0" name=""/>
-                      <p:cNvPicPr/>
-                      <p:nvPr/>
-                    </p:nvPicPr>
-                    <p:blipFill>
-                      <a:blip r:embed="rId4"/>
-                      <a:stretch>
-                        <a:fillRect/>
-                      </a:stretch>
-                    </p:blipFill>
-                    <p:spPr>
-                      <a:xfrm>
-                        <a:off x="685800" y="4399040"/>
-                        <a:ext cx="4096948" cy="1694587"/>
-                      </a:xfrm>
-                      <a:prstGeom prst="rect">
-                        <a:avLst/>
-                      </a:prstGeom>
-                    </p:spPr>
-                  </p:pic>
-                </p:oleObj>
-              </mc:Fallback>
-            </mc:AlternateContent>
-          </a:graphicData>
-        </a:graphic>
-      </p:graphicFrame>
-      <p:graphicFrame>
-        <p:nvGraphicFramePr>
-          <p:cNvPr id="4" name="Object 3">
-            <a:extLst>
-              <a:ext uri="{FF2B5EF4-FFF2-40B4-BE49-F238E27FC236}">
-                <a16:creationId xmlns:a16="http://schemas.microsoft.com/office/drawing/2014/main" id="{75A527BE-799A-44EB-BFE7-CFEE3682AB13}"/>
-              </a:ext>
-            </a:extLst>
-          </p:cNvPr>
-          <p:cNvGraphicFramePr>
-            <a:graphicFrameLocks noChangeAspect="1"/>
-          </p:cNvGraphicFramePr>
-          <p:nvPr>
-            <p:extLst>
-              <p:ext uri="{D42A27DB-BD31-4B8C-83A1-F6EECF244321}">
-                <p14:modId xmlns:p14="http://schemas.microsoft.com/office/powerpoint/2010/main" val="3318289288"/>
-              </p:ext>
-            </p:extLst>
-          </p:nvPr>
-        </p:nvGraphicFramePr>
-        <p:xfrm>
-          <a:off x="5323706" y="4628889"/>
-          <a:ext cx="6182494" cy="1464738"/>
-        </p:xfrm>
-        <a:graphic>
-          <a:graphicData uri="http://schemas.openxmlformats.org/presentationml/2006/ole">
-            <mc:AlternateContent xmlns:mc="http://schemas.openxmlformats.org/markup-compatibility/2006">
-              <mc:Choice xmlns:v="urn:schemas-microsoft-com:vml" Requires="v">
-                <p:oleObj spid="_x0000_s1045" name="Packager Shell Object" showAsIcon="1" r:id="rId5" imgW="1668600" imgH="394560" progId="Package">
-                  <p:embed/>
-                </p:oleObj>
-              </mc:Choice>
-              <mc:Fallback>
-                <p:oleObj name="Packager Shell Object" showAsIcon="1" r:id="rId5" imgW="1668600" imgH="394560" progId="Package">
-                  <p:embed/>
-                  <p:pic>
-                    <p:nvPicPr>
-                      <p:cNvPr id="0" name=""/>
-                      <p:cNvPicPr/>
-                      <p:nvPr/>
-                    </p:nvPicPr>
-                    <p:blipFill>
-                      <a:blip r:embed="rId6"/>
-                      <a:stretch>
-                        <a:fillRect/>
-                      </a:stretch>
-                    </p:blipFill>
-                    <p:spPr>
-                      <a:xfrm>
-                        <a:off x="5323706" y="4628889"/>
-                        <a:ext cx="6182494" cy="1464738"/>
-                      </a:xfrm>
-                      <a:prstGeom prst="rect">
-                        <a:avLst/>
-                      </a:prstGeom>
-                    </p:spPr>
-                  </p:pic>
-                </p:oleObj>
-              </mc:Fallback>
-            </mc:AlternateContent>
-          </a:graphicData>
-        </a:graphic>
-      </p:graphicFrame>
     </p:spTree>
     <p:extLst>
       <p:ext uri="{BB962C8B-B14F-4D97-AF65-F5344CB8AC3E}">

</xml_diff>

<commit_message>
Coursera tutorial: wk1: 03 Read Ascii String
</commit_message>
<xml_diff>
--- a/custom_projects/01_MicroSdCardInterfacing/01_MicroSdCardInterfacing.pptx
+++ b/custom_projects/01_MicroSdCardInterfacing/01_MicroSdCardInterfacing.pptx
@@ -288,7 +288,7 @@
           <a:p>
             <a:fld id="{48A87A34-81AB-432B-8DAE-1953F412C126}" type="datetimeFigureOut">
               <a:rPr lang="en-US" dirty="0"/>
-              <a:t>10/6/2019</a:t>
+              <a:t>10/7/2019</a:t>
             </a:fld>
             <a:endParaRPr lang="en-US" dirty="0"/>
           </a:p>
@@ -550,7 +550,7 @@
           <a:p>
             <a:fld id="{48A87A34-81AB-432B-8DAE-1953F412C126}" type="datetimeFigureOut">
               <a:rPr lang="en-US" dirty="0"/>
-              <a:t>10/6/2019</a:t>
+              <a:t>10/7/2019</a:t>
             </a:fld>
             <a:endParaRPr lang="en-US" dirty="0"/>
           </a:p>
@@ -777,7 +777,7 @@
             <a:fld id="{48A87A34-81AB-432B-8DAE-1953F412C126}" type="datetimeFigureOut">
               <a:rPr lang="en-US" dirty="0"/>
               <a:pPr/>
-              <a:t>10/6/2019</a:t>
+              <a:t>10/7/2019</a:t>
             </a:fld>
             <a:endParaRPr lang="en-US" dirty="0"/>
           </a:p>
@@ -1083,7 +1083,7 @@
             <a:fld id="{48A87A34-81AB-432B-8DAE-1953F412C126}" type="datetimeFigureOut">
               <a:rPr lang="en-US" dirty="0"/>
               <a:pPr/>
-              <a:t>10/6/2019</a:t>
+              <a:t>10/7/2019</a:t>
             </a:fld>
             <a:endParaRPr lang="en-US" dirty="0"/>
           </a:p>
@@ -1552,7 +1552,7 @@
             <a:fld id="{48A87A34-81AB-432B-8DAE-1953F412C126}" type="datetimeFigureOut">
               <a:rPr lang="en-US" dirty="0"/>
               <a:pPr/>
-              <a:t>10/6/2019</a:t>
+              <a:t>10/7/2019</a:t>
             </a:fld>
             <a:endParaRPr lang="en-US" dirty="0"/>
           </a:p>
@@ -2094,7 +2094,7 @@
           <a:p>
             <a:fld id="{48A87A34-81AB-432B-8DAE-1953F412C126}" type="datetimeFigureOut">
               <a:rPr lang="en-US" dirty="0"/>
-              <a:t>10/6/2019</a:t>
+              <a:t>10/7/2019</a:t>
             </a:fld>
             <a:endParaRPr lang="en-US" dirty="0"/>
           </a:p>
@@ -2863,7 +2863,7 @@
           <a:p>
             <a:fld id="{48A87A34-81AB-432B-8DAE-1953F412C126}" type="datetimeFigureOut">
               <a:rPr lang="en-US" dirty="0"/>
-              <a:t>10/6/2019</a:t>
+              <a:t>10/7/2019</a:t>
             </a:fld>
             <a:endParaRPr lang="en-US" dirty="0"/>
           </a:p>
@@ -3033,7 +3033,7 @@
           <a:p>
             <a:fld id="{48A87A34-81AB-432B-8DAE-1953F412C126}" type="datetimeFigureOut">
               <a:rPr lang="en-US" dirty="0"/>
-              <a:t>10/6/2019</a:t>
+              <a:t>10/7/2019</a:t>
             </a:fld>
             <a:endParaRPr lang="en-US" dirty="0"/>
           </a:p>
@@ -3252,7 +3252,7 @@
             <a:fld id="{48A87A34-81AB-432B-8DAE-1953F412C126}" type="datetimeFigureOut">
               <a:rPr lang="en-US" dirty="0"/>
               <a:pPr/>
-              <a:t>10/6/2019</a:t>
+              <a:t>10/7/2019</a:t>
             </a:fld>
             <a:endParaRPr lang="en-US" dirty="0"/>
           </a:p>
@@ -3427,7 +3427,7 @@
           <a:p>
             <a:fld id="{48A87A34-81AB-432B-8DAE-1953F412C126}" type="datetimeFigureOut">
               <a:rPr lang="en-US" dirty="0"/>
-              <a:t>10/6/2019</a:t>
+              <a:t>10/7/2019</a:t>
             </a:fld>
             <a:endParaRPr lang="en-US" dirty="0"/>
           </a:p>
@@ -3712,7 +3712,7 @@
             <a:fld id="{48A87A34-81AB-432B-8DAE-1953F412C126}" type="datetimeFigureOut">
               <a:rPr lang="en-US" dirty="0"/>
               <a:pPr/>
-              <a:t>10/6/2019</a:t>
+              <a:t>10/7/2019</a:t>
             </a:fld>
             <a:endParaRPr lang="en-US" dirty="0"/>
           </a:p>
@@ -3949,7 +3949,7 @@
           <a:p>
             <a:fld id="{48A87A34-81AB-432B-8DAE-1953F412C126}" type="datetimeFigureOut">
               <a:rPr lang="en-US" dirty="0"/>
-              <a:t>10/6/2019</a:t>
+              <a:t>10/7/2019</a:t>
             </a:fld>
             <a:endParaRPr lang="en-US" dirty="0"/>
           </a:p>
@@ -4323,7 +4323,7 @@
           <a:p>
             <a:fld id="{48A87A34-81AB-432B-8DAE-1953F412C126}" type="datetimeFigureOut">
               <a:rPr lang="en-US" dirty="0"/>
-              <a:t>10/6/2019</a:t>
+              <a:t>10/7/2019</a:t>
             </a:fld>
             <a:endParaRPr lang="en-US" dirty="0"/>
           </a:p>
@@ -4436,7 +4436,7 @@
           <a:p>
             <a:fld id="{48A87A34-81AB-432B-8DAE-1953F412C126}" type="datetimeFigureOut">
               <a:rPr lang="en-US" dirty="0"/>
-              <a:t>10/6/2019</a:t>
+              <a:t>10/7/2019</a:t>
             </a:fld>
             <a:endParaRPr lang="en-US" dirty="0"/>
           </a:p>
@@ -4526,7 +4526,7 @@
           <a:p>
             <a:fld id="{48A87A34-81AB-432B-8DAE-1953F412C126}" type="datetimeFigureOut">
               <a:rPr lang="en-US" dirty="0"/>
-              <a:t>10/6/2019</a:t>
+              <a:t>10/7/2019</a:t>
             </a:fld>
             <a:endParaRPr lang="en-US" dirty="0"/>
           </a:p>
@@ -4770,7 +4770,7 @@
           <a:p>
             <a:fld id="{48A87A34-81AB-432B-8DAE-1953F412C126}" type="datetimeFigureOut">
               <a:rPr lang="en-US" dirty="0"/>
-              <a:t>10/6/2019</a:t>
+              <a:t>10/7/2019</a:t>
             </a:fld>
             <a:endParaRPr lang="en-US" dirty="0"/>
           </a:p>
@@ -5022,7 +5022,7 @@
           <a:p>
             <a:fld id="{48A87A34-81AB-432B-8DAE-1953F412C126}" type="datetimeFigureOut">
               <a:rPr lang="en-US" dirty="0"/>
-              <a:t>10/6/2019</a:t>
+              <a:t>10/7/2019</a:t>
             </a:fld>
             <a:endParaRPr lang="en-US" dirty="0"/>
           </a:p>
@@ -5261,7 +5261,7 @@
             <a:fld id="{48A87A34-81AB-432B-8DAE-1953F412C126}" type="datetimeFigureOut">
               <a:rPr lang="en-US" dirty="0"/>
               <a:pPr/>
-              <a:t>10/6/2019</a:t>
+              <a:t>10/7/2019</a:t>
             </a:fld>
             <a:endParaRPr lang="en-US" dirty="0"/>
           </a:p>
@@ -5694,7 +5694,15 @@
             <a:pPr algn="r"/>
             <a:r>
               <a:rPr lang="en-US" dirty="0"/>
-              <a:t>SD Card Interfacing</a:t>
+              <a:t>Temp Logger (</a:t>
+            </a:r>
+            <a:r>
+              <a:rPr lang="en-US" dirty="0" err="1"/>
+              <a:t>freertos</a:t>
+            </a:r>
+            <a:r>
+              <a:rPr lang="en-US" dirty="0"/>
+              <a:t> based)</a:t>
             </a:r>
           </a:p>
         </p:txBody>
@@ -5719,15 +5727,6 @@
         <p:txBody>
           <a:bodyPr/>
           <a:lstStyle/>
-          <a:p>
-            <a:r>
-              <a:rPr lang="en-US" dirty="0">
-                <a:hlinkClick r:id="rId2"/>
-              </a:rPr>
-              <a:t>https://www.instructables.com/id/Micro-SD-Card-Tutorial/</a:t>
-            </a:r>
-            <a:endParaRPr lang="en-US" dirty="0"/>
-          </a:p>
           <a:p>
             <a:endParaRPr lang="en-US" dirty="0"/>
           </a:p>
@@ -5788,7 +5787,7 @@
           <a:p>
             <a:r>
               <a:rPr lang="en-US" dirty="0"/>
-              <a:t>SDCARD INTERFACING</a:t>
+              <a:t>Temp logger</a:t>
             </a:r>
           </a:p>
         </p:txBody>
@@ -5814,36 +5813,7 @@
           <a:bodyPr/>
           <a:lstStyle/>
           <a:p>
-            <a:r>
-              <a:rPr lang="en-US" dirty="0"/>
-              <a:t>Micro SD Card is used for </a:t>
-            </a:r>
-            <a:r>
-              <a:rPr lang="en-US" dirty="0" err="1"/>
-              <a:t>transfering</a:t>
-            </a:r>
-            <a:r>
-              <a:rPr lang="en-US" dirty="0"/>
-              <a:t> data to and from a standard sd card.</a:t>
-            </a:r>
-          </a:p>
-          <a:p>
-            <a:endParaRPr lang="en-US" dirty="0"/>
-          </a:p>
-          <a:p>
-            <a:r>
-              <a:rPr lang="en-US" dirty="0"/>
-              <a:t>The pin out is directly compatible with Arduino and also can be used with other microcontrollers. </a:t>
-            </a:r>
-          </a:p>
-          <a:p>
-            <a:endParaRPr lang="en-US" dirty="0"/>
-          </a:p>
-          <a:p>
-            <a:r>
-              <a:rPr lang="en-US" dirty="0"/>
-              <a:t>It allow us to add mass storage and data logging to our project.</a:t>
-            </a:r>
+            <a:endParaRPr lang="en-US" dirty="0"/>
           </a:p>
         </p:txBody>
       </p:sp>

</xml_diff>

<commit_message>
Custom Projects:  Added TO DO GREAT PROJECTS ppt
</commit_message>
<xml_diff>
--- a/custom_projects/01_MicroSdCardInterfacing/01_MicroSdCardInterfacing.pptx
+++ b/custom_projects/01_MicroSdCardInterfacing/01_MicroSdCardInterfacing.pptx
@@ -9,9 +9,11 @@
     <p:sldId id="257" r:id="rId3"/>
     <p:sldId id="258" r:id="rId4"/>
     <p:sldId id="259" r:id="rId5"/>
-    <p:sldId id="261" r:id="rId6"/>
-    <p:sldId id="264" r:id="rId7"/>
-    <p:sldId id="263" r:id="rId8"/>
+    <p:sldId id="266" r:id="rId6"/>
+    <p:sldId id="261" r:id="rId7"/>
+    <p:sldId id="264" r:id="rId8"/>
+    <p:sldId id="263" r:id="rId9"/>
+    <p:sldId id="265" r:id="rId10"/>
   </p:sldIdLst>
   <p:sldSz cx="12192000" cy="6858000"/>
   <p:notesSz cx="6858000" cy="9144000"/>
@@ -288,7 +290,7 @@
           <a:p>
             <a:fld id="{48A87A34-81AB-432B-8DAE-1953F412C126}" type="datetimeFigureOut">
               <a:rPr lang="en-US" dirty="0"/>
-              <a:t>10/7/2019</a:t>
+              <a:t>10/19/2019</a:t>
             </a:fld>
             <a:endParaRPr lang="en-US" dirty="0"/>
           </a:p>
@@ -550,7 +552,7 @@
           <a:p>
             <a:fld id="{48A87A34-81AB-432B-8DAE-1953F412C126}" type="datetimeFigureOut">
               <a:rPr lang="en-US" dirty="0"/>
-              <a:t>10/7/2019</a:t>
+              <a:t>10/19/2019</a:t>
             </a:fld>
             <a:endParaRPr lang="en-US" dirty="0"/>
           </a:p>
@@ -777,7 +779,7 @@
             <a:fld id="{48A87A34-81AB-432B-8DAE-1953F412C126}" type="datetimeFigureOut">
               <a:rPr lang="en-US" dirty="0"/>
               <a:pPr/>
-              <a:t>10/7/2019</a:t>
+              <a:t>10/19/2019</a:t>
             </a:fld>
             <a:endParaRPr lang="en-US" dirty="0"/>
           </a:p>
@@ -1083,7 +1085,7 @@
             <a:fld id="{48A87A34-81AB-432B-8DAE-1953F412C126}" type="datetimeFigureOut">
               <a:rPr lang="en-US" dirty="0"/>
               <a:pPr/>
-              <a:t>10/7/2019</a:t>
+              <a:t>10/19/2019</a:t>
             </a:fld>
             <a:endParaRPr lang="en-US" dirty="0"/>
           </a:p>
@@ -1552,7 +1554,7 @@
             <a:fld id="{48A87A34-81AB-432B-8DAE-1953F412C126}" type="datetimeFigureOut">
               <a:rPr lang="en-US" dirty="0"/>
               <a:pPr/>
-              <a:t>10/7/2019</a:t>
+              <a:t>10/19/2019</a:t>
             </a:fld>
             <a:endParaRPr lang="en-US" dirty="0"/>
           </a:p>
@@ -2094,7 +2096,7 @@
           <a:p>
             <a:fld id="{48A87A34-81AB-432B-8DAE-1953F412C126}" type="datetimeFigureOut">
               <a:rPr lang="en-US" dirty="0"/>
-              <a:t>10/7/2019</a:t>
+              <a:t>10/19/2019</a:t>
             </a:fld>
             <a:endParaRPr lang="en-US" dirty="0"/>
           </a:p>
@@ -2863,7 +2865,7 @@
           <a:p>
             <a:fld id="{48A87A34-81AB-432B-8DAE-1953F412C126}" type="datetimeFigureOut">
               <a:rPr lang="en-US" dirty="0"/>
-              <a:t>10/7/2019</a:t>
+              <a:t>10/19/2019</a:t>
             </a:fld>
             <a:endParaRPr lang="en-US" dirty="0"/>
           </a:p>
@@ -3033,7 +3035,7 @@
           <a:p>
             <a:fld id="{48A87A34-81AB-432B-8DAE-1953F412C126}" type="datetimeFigureOut">
               <a:rPr lang="en-US" dirty="0"/>
-              <a:t>10/7/2019</a:t>
+              <a:t>10/19/2019</a:t>
             </a:fld>
             <a:endParaRPr lang="en-US" dirty="0"/>
           </a:p>
@@ -3252,7 +3254,7 @@
             <a:fld id="{48A87A34-81AB-432B-8DAE-1953F412C126}" type="datetimeFigureOut">
               <a:rPr lang="en-US" dirty="0"/>
               <a:pPr/>
-              <a:t>10/7/2019</a:t>
+              <a:t>10/19/2019</a:t>
             </a:fld>
             <a:endParaRPr lang="en-US" dirty="0"/>
           </a:p>
@@ -3427,7 +3429,7 @@
           <a:p>
             <a:fld id="{48A87A34-81AB-432B-8DAE-1953F412C126}" type="datetimeFigureOut">
               <a:rPr lang="en-US" dirty="0"/>
-              <a:t>10/7/2019</a:t>
+              <a:t>10/19/2019</a:t>
             </a:fld>
             <a:endParaRPr lang="en-US" dirty="0"/>
           </a:p>
@@ -3712,7 +3714,7 @@
             <a:fld id="{48A87A34-81AB-432B-8DAE-1953F412C126}" type="datetimeFigureOut">
               <a:rPr lang="en-US" dirty="0"/>
               <a:pPr/>
-              <a:t>10/7/2019</a:t>
+              <a:t>10/19/2019</a:t>
             </a:fld>
             <a:endParaRPr lang="en-US" dirty="0"/>
           </a:p>
@@ -3949,7 +3951,7 @@
           <a:p>
             <a:fld id="{48A87A34-81AB-432B-8DAE-1953F412C126}" type="datetimeFigureOut">
               <a:rPr lang="en-US" dirty="0"/>
-              <a:t>10/7/2019</a:t>
+              <a:t>10/19/2019</a:t>
             </a:fld>
             <a:endParaRPr lang="en-US" dirty="0"/>
           </a:p>
@@ -4323,7 +4325,7 @@
           <a:p>
             <a:fld id="{48A87A34-81AB-432B-8DAE-1953F412C126}" type="datetimeFigureOut">
               <a:rPr lang="en-US" dirty="0"/>
-              <a:t>10/7/2019</a:t>
+              <a:t>10/19/2019</a:t>
             </a:fld>
             <a:endParaRPr lang="en-US" dirty="0"/>
           </a:p>
@@ -4436,7 +4438,7 @@
           <a:p>
             <a:fld id="{48A87A34-81AB-432B-8DAE-1953F412C126}" type="datetimeFigureOut">
               <a:rPr lang="en-US" dirty="0"/>
-              <a:t>10/7/2019</a:t>
+              <a:t>10/19/2019</a:t>
             </a:fld>
             <a:endParaRPr lang="en-US" dirty="0"/>
           </a:p>
@@ -4526,7 +4528,7 @@
           <a:p>
             <a:fld id="{48A87A34-81AB-432B-8DAE-1953F412C126}" type="datetimeFigureOut">
               <a:rPr lang="en-US" dirty="0"/>
-              <a:t>10/7/2019</a:t>
+              <a:t>10/19/2019</a:t>
             </a:fld>
             <a:endParaRPr lang="en-US" dirty="0"/>
           </a:p>
@@ -4770,7 +4772,7 @@
           <a:p>
             <a:fld id="{48A87A34-81AB-432B-8DAE-1953F412C126}" type="datetimeFigureOut">
               <a:rPr lang="en-US" dirty="0"/>
-              <a:t>10/7/2019</a:t>
+              <a:t>10/19/2019</a:t>
             </a:fld>
             <a:endParaRPr lang="en-US" dirty="0"/>
           </a:p>
@@ -5022,7 +5024,7 @@
           <a:p>
             <a:fld id="{48A87A34-81AB-432B-8DAE-1953F412C126}" type="datetimeFigureOut">
               <a:rPr lang="en-US" dirty="0"/>
-              <a:t>10/7/2019</a:t>
+              <a:t>10/19/2019</a:t>
             </a:fld>
             <a:endParaRPr lang="en-US" dirty="0"/>
           </a:p>
@@ -5261,7 +5263,7 @@
             <a:fld id="{48A87A34-81AB-432B-8DAE-1953F412C126}" type="datetimeFigureOut">
               <a:rPr lang="en-US" dirty="0"/>
               <a:pPr/>
-              <a:t>10/7/2019</a:t>
+              <a:t>10/19/2019</a:t>
             </a:fld>
             <a:endParaRPr lang="en-US" dirty="0"/>
           </a:p>
@@ -5694,15 +5696,7 @@
             <a:pPr algn="r"/>
             <a:r>
               <a:rPr lang="en-US" dirty="0"/>
-              <a:t>Temp Logger (</a:t>
-            </a:r>
-            <a:r>
-              <a:rPr lang="en-US" dirty="0" err="1"/>
-              <a:t>freertos</a:t>
-            </a:r>
-            <a:r>
-              <a:rPr lang="en-US" dirty="0"/>
-              <a:t> based)</a:t>
+              <a:t>MMC Card interfacing</a:t>
             </a:r>
           </a:p>
         </p:txBody>
@@ -5787,7 +5781,7 @@
           <a:p>
             <a:r>
               <a:rPr lang="en-US" dirty="0"/>
-              <a:t>Temp logger</a:t>
+              <a:t>MMC Card interfacing</a:t>
             </a:r>
           </a:p>
         </p:txBody>
@@ -5917,7 +5911,7 @@
           <a:p>
             <a:r>
               <a:rPr lang="en-US" dirty="0"/>
-              <a:t>Micro Sd Card Module</a:t>
+              <a:t>MMC shield (Arduino, Adafruit based) – we used Arduino based shield </a:t>
             </a:r>
           </a:p>
           <a:p>
@@ -5929,7 +5923,7 @@
           <a:p>
             <a:r>
               <a:rPr lang="en-US" dirty="0"/>
-              <a:t>SD Card</a:t>
+              <a:t>MMC Card</a:t>
             </a:r>
           </a:p>
           <a:p>
@@ -5993,6 +5987,225 @@
             <a:r>
               <a:rPr lang="en-US" dirty="0"/>
               <a:t>SOFTWARE Required</a:t>
+            </a:r>
+          </a:p>
+        </p:txBody>
+      </p:sp>
+      <p:sp>
+        <p:nvSpPr>
+          <p:cNvPr id="5" name="Content Placeholder 2">
+            <a:extLst>
+              <a:ext uri="{FF2B5EF4-FFF2-40B4-BE49-F238E27FC236}">
+                <a16:creationId xmlns:a16="http://schemas.microsoft.com/office/drawing/2014/main" id="{638275C9-F408-4F70-9D73-C963C2A3EF22}"/>
+              </a:ext>
+            </a:extLst>
+          </p:cNvPr>
+          <p:cNvSpPr txBox="1">
+            <a:spLocks/>
+          </p:cNvSpPr>
+          <p:nvPr/>
+        </p:nvSpPr>
+        <p:spPr>
+          <a:xfrm>
+            <a:off x="685800" y="5496561"/>
+            <a:ext cx="10820400" cy="1259944"/>
+          </a:xfrm>
+          <a:prstGeom prst="rect">
+            <a:avLst/>
+          </a:prstGeom>
+        </p:spPr>
+        <p:txBody>
+          <a:bodyPr vert="horz" lIns="91440" tIns="45720" rIns="91440" bIns="45720" rtlCol="0">
+            <a:normAutofit/>
+          </a:bodyPr>
+          <a:lstStyle>
+            <a:lvl1pPr marL="228600" indent="-228600" algn="l" defTabSz="914400" rtl="0" eaLnBrk="1" latinLnBrk="0" hangingPunct="1">
+              <a:lnSpc>
+                <a:spcPct val="90000"/>
+              </a:lnSpc>
+              <a:spcBef>
+                <a:spcPts val="1000"/>
+              </a:spcBef>
+              <a:buFont typeface="Arial" panose="020B0604020202020204" pitchFamily="34" charset="0"/>
+              <a:buChar char="•"/>
+              <a:defRPr sz="2200" kern="1200">
+                <a:solidFill>
+                  <a:schemeClr val="tx1"/>
+                </a:solidFill>
+                <a:latin typeface="+mn-lt"/>
+                <a:ea typeface="+mn-ea"/>
+                <a:cs typeface="+mn-cs"/>
+              </a:defRPr>
+            </a:lvl1pPr>
+            <a:lvl2pPr marL="685800" indent="-228600" algn="l" defTabSz="914400" rtl="0" eaLnBrk="1" latinLnBrk="0" hangingPunct="1">
+              <a:lnSpc>
+                <a:spcPct val="90000"/>
+              </a:lnSpc>
+              <a:spcBef>
+                <a:spcPts val="500"/>
+              </a:spcBef>
+              <a:buFont typeface="Arial" panose="020B0604020202020204" pitchFamily="34" charset="0"/>
+              <a:buChar char="•"/>
+              <a:defRPr sz="2000" kern="1200">
+                <a:solidFill>
+                  <a:schemeClr val="tx1"/>
+                </a:solidFill>
+                <a:latin typeface="+mn-lt"/>
+                <a:ea typeface="+mn-ea"/>
+                <a:cs typeface="+mn-cs"/>
+              </a:defRPr>
+            </a:lvl2pPr>
+            <a:lvl3pPr marL="1143000" indent="-228600" algn="l" defTabSz="914400" rtl="0" eaLnBrk="1" latinLnBrk="0" hangingPunct="1">
+              <a:lnSpc>
+                <a:spcPct val="90000"/>
+              </a:lnSpc>
+              <a:spcBef>
+                <a:spcPts val="500"/>
+              </a:spcBef>
+              <a:buFont typeface="Arial" panose="020B0604020202020204" pitchFamily="34" charset="0"/>
+              <a:buChar char="•"/>
+              <a:defRPr sz="1800" kern="1200">
+                <a:solidFill>
+                  <a:schemeClr val="tx1"/>
+                </a:solidFill>
+                <a:latin typeface="+mn-lt"/>
+                <a:ea typeface="+mn-ea"/>
+                <a:cs typeface="+mn-cs"/>
+              </a:defRPr>
+            </a:lvl3pPr>
+            <a:lvl4pPr marL="1600200" indent="-228600" algn="l" defTabSz="914400" rtl="0" eaLnBrk="1" latinLnBrk="0" hangingPunct="1">
+              <a:lnSpc>
+                <a:spcPct val="90000"/>
+              </a:lnSpc>
+              <a:spcBef>
+                <a:spcPts val="500"/>
+              </a:spcBef>
+              <a:buFont typeface="Arial" panose="020B0604020202020204" pitchFamily="34" charset="0"/>
+              <a:buChar char="•"/>
+              <a:defRPr sz="1600" kern="1200">
+                <a:solidFill>
+                  <a:schemeClr val="tx1"/>
+                </a:solidFill>
+                <a:latin typeface="+mn-lt"/>
+                <a:ea typeface="+mn-ea"/>
+                <a:cs typeface="+mn-cs"/>
+              </a:defRPr>
+            </a:lvl4pPr>
+            <a:lvl5pPr marL="2057400" indent="-228600" algn="l" defTabSz="914400" rtl="0" eaLnBrk="1" latinLnBrk="0" hangingPunct="1">
+              <a:lnSpc>
+                <a:spcPct val="90000"/>
+              </a:lnSpc>
+              <a:spcBef>
+                <a:spcPts val="500"/>
+              </a:spcBef>
+              <a:buFont typeface="Arial" panose="020B0604020202020204" pitchFamily="34" charset="0"/>
+              <a:buChar char="•"/>
+              <a:defRPr sz="1600" kern="1200">
+                <a:solidFill>
+                  <a:schemeClr val="tx1"/>
+                </a:solidFill>
+                <a:latin typeface="+mn-lt"/>
+                <a:ea typeface="+mn-ea"/>
+                <a:cs typeface="+mn-cs"/>
+              </a:defRPr>
+            </a:lvl5pPr>
+            <a:lvl6pPr marL="2514600" indent="-228600" algn="l" defTabSz="914400" rtl="0" eaLnBrk="1" latinLnBrk="0" hangingPunct="1">
+              <a:lnSpc>
+                <a:spcPct val="90000"/>
+              </a:lnSpc>
+              <a:spcBef>
+                <a:spcPts val="500"/>
+              </a:spcBef>
+              <a:buFont typeface="Arial" panose="020B0604020202020204" pitchFamily="34" charset="0"/>
+              <a:buChar char="•"/>
+              <a:defRPr sz="1600" kern="1200">
+                <a:solidFill>
+                  <a:schemeClr val="tx1"/>
+                </a:solidFill>
+                <a:latin typeface="+mn-lt"/>
+                <a:ea typeface="+mn-ea"/>
+                <a:cs typeface="+mn-cs"/>
+              </a:defRPr>
+            </a:lvl6pPr>
+            <a:lvl7pPr marL="2971800" indent="-228600" algn="l" defTabSz="914400" rtl="0" eaLnBrk="1" latinLnBrk="0" hangingPunct="1">
+              <a:lnSpc>
+                <a:spcPct val="90000"/>
+              </a:lnSpc>
+              <a:spcBef>
+                <a:spcPts val="500"/>
+              </a:spcBef>
+              <a:buFont typeface="Arial" panose="020B0604020202020204" pitchFamily="34" charset="0"/>
+              <a:buChar char="•"/>
+              <a:defRPr sz="1600" kern="1200">
+                <a:solidFill>
+                  <a:schemeClr val="tx1"/>
+                </a:solidFill>
+                <a:latin typeface="+mn-lt"/>
+                <a:ea typeface="+mn-ea"/>
+                <a:cs typeface="+mn-cs"/>
+              </a:defRPr>
+            </a:lvl7pPr>
+            <a:lvl8pPr marL="3429000" indent="-228600" algn="l" defTabSz="914400" rtl="0" eaLnBrk="1" latinLnBrk="0" hangingPunct="1">
+              <a:lnSpc>
+                <a:spcPct val="90000"/>
+              </a:lnSpc>
+              <a:spcBef>
+                <a:spcPts val="500"/>
+              </a:spcBef>
+              <a:buFont typeface="Arial" panose="020B0604020202020204" pitchFamily="34" charset="0"/>
+              <a:buChar char="•"/>
+              <a:defRPr sz="1600" kern="1200">
+                <a:solidFill>
+                  <a:schemeClr val="tx1"/>
+                </a:solidFill>
+                <a:latin typeface="+mn-lt"/>
+                <a:ea typeface="+mn-ea"/>
+                <a:cs typeface="+mn-cs"/>
+              </a:defRPr>
+            </a:lvl8pPr>
+            <a:lvl9pPr marL="3886200" indent="-228600" algn="l" defTabSz="914400" rtl="0" eaLnBrk="1" latinLnBrk="0" hangingPunct="1">
+              <a:lnSpc>
+                <a:spcPct val="90000"/>
+              </a:lnSpc>
+              <a:spcBef>
+                <a:spcPts val="500"/>
+              </a:spcBef>
+              <a:buFont typeface="Arial" panose="020B0604020202020204" pitchFamily="34" charset="0"/>
+              <a:buChar char="•"/>
+              <a:defRPr sz="1600" kern="1200">
+                <a:solidFill>
+                  <a:schemeClr val="tx1"/>
+                </a:solidFill>
+                <a:latin typeface="+mn-lt"/>
+                <a:ea typeface="+mn-ea"/>
+                <a:cs typeface="+mn-cs"/>
+              </a:defRPr>
+            </a:lvl9pPr>
+          </a:lstStyle>
+          <a:p>
+            <a:r>
+              <a:rPr lang="en-US" dirty="0"/>
+              <a:t>Sd2Card library class</a:t>
+            </a:r>
+          </a:p>
+          <a:p>
+            <a:r>
+              <a:rPr lang="en-US" dirty="0" err="1"/>
+              <a:t>SdVolume</a:t>
+            </a:r>
+            <a:r>
+              <a:rPr lang="en-US" dirty="0"/>
+              <a:t> library class</a:t>
+            </a:r>
+          </a:p>
+          <a:p>
+            <a:r>
+              <a:rPr lang="en-US" dirty="0" err="1"/>
+              <a:t>SdFile</a:t>
+            </a:r>
+            <a:r>
+              <a:rPr lang="en-US" dirty="0"/>
+              <a:t> library class</a:t>
             </a:r>
           </a:p>
         </p:txBody>
@@ -6070,7 +6283,7 @@
         <p:spPr>
           <a:xfrm>
             <a:off x="7406936" y="1864674"/>
-            <a:ext cx="4613429" cy="3139321"/>
+            <a:ext cx="4613429" cy="3416320"/>
           </a:xfrm>
           <a:prstGeom prst="rect">
             <a:avLst/>
@@ -6108,7 +6321,7 @@
             </a:pPr>
             <a:r>
               <a:rPr lang="en-US" dirty="0"/>
-              <a:t>Connect CS to pin 14</a:t>
+              <a:t>Connect CS to pin 10 / 4 / 14 (Depends on shield or adapter used)</a:t>
             </a:r>
           </a:p>
           <a:p>
@@ -6137,8 +6350,12 @@
               <a:buChar char="•"/>
             </a:pPr>
             <a:r>
+              <a:rPr lang="en-US"/>
+              <a:t>Connect </a:t>
+            </a:r>
+            <a:r>
               <a:rPr lang="en-US" dirty="0"/>
-              <a:t>Lastly, connect MISO to pin 12</a:t>
+              <a:t>MISO to pin 12</a:t>
             </a:r>
           </a:p>
           <a:p>
@@ -6320,6 +6537,127 @@
               <a:effectLst/>
               <a:latin typeface="Nunito"/>
             </a:endParaRPr>
+          </a:p>
+        </p:txBody>
+      </p:sp>
+      <p:pic>
+        <p:nvPicPr>
+          <p:cNvPr id="8" name="Picture 2" descr="https://robu.in/wp-content/uploads/2016/03/New-Data-Logger-Module-Logging-Recorder-Shield-V1-0-for-Arduino-UNO-SD-Card.jpg_640x640.jpg">
+            <a:extLst>
+              <a:ext uri="{FF2B5EF4-FFF2-40B4-BE49-F238E27FC236}">
+                <a16:creationId xmlns:a16="http://schemas.microsoft.com/office/drawing/2014/main" id="{0785EA2E-B76D-481B-9F8F-17521903C96A}"/>
+              </a:ext>
+            </a:extLst>
+          </p:cNvPr>
+          <p:cNvPicPr>
+            <a:picLocks noChangeAspect="1" noChangeArrowheads="1"/>
+          </p:cNvPicPr>
+          <p:nvPr/>
+        </p:nvPicPr>
+        <p:blipFill>
+          <a:blip r:embed="rId3">
+            <a:extLst>
+              <a:ext uri="{28A0092B-C50C-407E-A947-70E740481C1C}">
+                <a14:useLocalDpi xmlns:a14="http://schemas.microsoft.com/office/drawing/2010/main" val="0"/>
+              </a:ext>
+            </a:extLst>
+          </a:blip>
+          <a:srcRect/>
+          <a:stretch>
+            <a:fillRect/>
+          </a:stretch>
+        </p:blipFill>
+        <p:spPr bwMode="auto">
+          <a:xfrm>
+            <a:off x="9829799" y="4800600"/>
+            <a:ext cx="1965325" cy="1965325"/>
+          </a:xfrm>
+          <a:prstGeom prst="rect">
+            <a:avLst/>
+          </a:prstGeom>
+          <a:noFill/>
+          <a:extLst>
+            <a:ext uri="{909E8E84-426E-40DD-AFC4-6F175D3DCCD1}">
+              <a14:hiddenFill xmlns:a14="http://schemas.microsoft.com/office/drawing/2010/main">
+                <a:solidFill>
+                  <a:srgbClr val="FFFFFF"/>
+                </a:solidFill>
+              </a14:hiddenFill>
+            </a:ext>
+          </a:extLst>
+        </p:spPr>
+      </p:pic>
+      <p:sp>
+        <p:nvSpPr>
+          <p:cNvPr id="3" name="Rectangle 2">
+            <a:extLst>
+              <a:ext uri="{FF2B5EF4-FFF2-40B4-BE49-F238E27FC236}">
+                <a16:creationId xmlns:a16="http://schemas.microsoft.com/office/drawing/2014/main" id="{C27C3D62-7587-4CF8-8432-E3A970435185}"/>
+              </a:ext>
+            </a:extLst>
+          </p:cNvPr>
+          <p:cNvSpPr/>
+          <p:nvPr/>
+        </p:nvSpPr>
+        <p:spPr>
+          <a:xfrm>
+            <a:off x="8776038" y="6069566"/>
+            <a:ext cx="1616148" cy="646331"/>
+          </a:xfrm>
+          <a:prstGeom prst="rect">
+            <a:avLst/>
+          </a:prstGeom>
+        </p:spPr>
+        <p:txBody>
+          <a:bodyPr wrap="none">
+            <a:spAutoFit/>
+          </a:bodyPr>
+          <a:lstStyle/>
+          <a:p>
+            <a:r>
+              <a:rPr lang="en-US" dirty="0"/>
+              <a:t>MMC + RTC  </a:t>
+            </a:r>
+          </a:p>
+          <a:p>
+            <a:r>
+              <a:rPr lang="en-US" dirty="0"/>
+              <a:t>Shield</a:t>
+            </a:r>
+          </a:p>
+        </p:txBody>
+      </p:sp>
+      <p:sp>
+        <p:nvSpPr>
+          <p:cNvPr id="9" name="Rectangle 8">
+            <a:extLst>
+              <a:ext uri="{FF2B5EF4-FFF2-40B4-BE49-F238E27FC236}">
+                <a16:creationId xmlns:a16="http://schemas.microsoft.com/office/drawing/2014/main" id="{6A2E779C-4782-403E-8358-54DBB9030F45}"/>
+              </a:ext>
+            </a:extLst>
+          </p:cNvPr>
+          <p:cNvSpPr/>
+          <p:nvPr/>
+        </p:nvSpPr>
+        <p:spPr>
+          <a:xfrm>
+            <a:off x="5287926" y="3014262"/>
+            <a:ext cx="1802096" cy="369332"/>
+          </a:xfrm>
+          <a:prstGeom prst="rect">
+            <a:avLst/>
+          </a:prstGeom>
+        </p:spPr>
+        <p:txBody>
+          <a:bodyPr wrap="none">
+            <a:spAutoFit/>
+          </a:bodyPr>
+          <a:lstStyle/>
+          <a:p>
+            <a:r>
+              <a:rPr lang="en-US" dirty="0"/>
+              <a:t>MMC Adapter</a:t>
+            </a:r>
           </a:p>
         </p:txBody>
       </p:sp>
@@ -6353,12 +6691,59 @@
           <a:chExt cx="0" cy="0"/>
         </a:xfrm>
       </p:grpSpPr>
+      <p:pic>
+        <p:nvPicPr>
+          <p:cNvPr id="4098" name="Picture 2" descr="adafruit_products_schem.png">
+            <a:extLst>
+              <a:ext uri="{FF2B5EF4-FFF2-40B4-BE49-F238E27FC236}">
+                <a16:creationId xmlns:a16="http://schemas.microsoft.com/office/drawing/2014/main" id="{32129CCB-7B68-444E-8C33-5EE532351957}"/>
+              </a:ext>
+            </a:extLst>
+          </p:cNvPr>
+          <p:cNvPicPr>
+            <a:picLocks noChangeAspect="1" noChangeArrowheads="1"/>
+          </p:cNvPicPr>
+          <p:nvPr/>
+        </p:nvPicPr>
+        <p:blipFill>
+          <a:blip r:embed="rId2">
+            <a:extLst>
+              <a:ext uri="{28A0092B-C50C-407E-A947-70E740481C1C}">
+                <a14:useLocalDpi xmlns:a14="http://schemas.microsoft.com/office/drawing/2010/main" val="0"/>
+              </a:ext>
+            </a:extLst>
+          </a:blip>
+          <a:srcRect/>
+          <a:stretch>
+            <a:fillRect/>
+          </a:stretch>
+        </p:blipFill>
+        <p:spPr bwMode="auto">
+          <a:xfrm>
+            <a:off x="1" y="541538"/>
+            <a:ext cx="8465814" cy="6316462"/>
+          </a:xfrm>
+          <a:prstGeom prst="rect">
+            <a:avLst/>
+          </a:prstGeom>
+          <a:noFill/>
+          <a:extLst>
+            <a:ext uri="{909E8E84-426E-40DD-AFC4-6F175D3DCCD1}">
+              <a14:hiddenFill xmlns:a14="http://schemas.microsoft.com/office/drawing/2010/main">
+                <a:solidFill>
+                  <a:srgbClr val="FFFFFF"/>
+                </a:solidFill>
+              </a14:hiddenFill>
+            </a:ext>
+          </a:extLst>
+        </p:spPr>
+      </p:pic>
       <p:sp>
         <p:nvSpPr>
           <p:cNvPr id="2" name="Title 1">
             <a:extLst>
               <a:ext uri="{FF2B5EF4-FFF2-40B4-BE49-F238E27FC236}">
-                <a16:creationId xmlns:a16="http://schemas.microsoft.com/office/drawing/2014/main" id="{A459E8BF-0FF2-4C76-8952-3960E75A89F1}"/>
+                <a16:creationId xmlns:a16="http://schemas.microsoft.com/office/drawing/2014/main" id="{96B42ADA-6770-402C-9F0B-A3C5159885CA}"/>
               </a:ext>
             </a:extLst>
           </p:cNvPr>
@@ -6369,226 +6754,29 @@
             <p:ph type="title"/>
           </p:nvPr>
         </p:nvSpPr>
-        <p:spPr/>
+        <p:spPr>
+          <a:xfrm>
+            <a:off x="2895600" y="764373"/>
+            <a:ext cx="8610600" cy="1293028"/>
+          </a:xfrm>
+        </p:spPr>
         <p:txBody>
           <a:bodyPr/>
           <a:lstStyle/>
           <a:p>
             <a:r>
               <a:rPr lang="en-US" dirty="0"/>
-              <a:t>Code – MMC R/W</a:t>
-            </a:r>
-          </a:p>
-        </p:txBody>
-      </p:sp>
-      <p:sp>
-        <p:nvSpPr>
-          <p:cNvPr id="3" name="Content Placeholder 2">
+              <a:t>SCHEMATIC</a:t>
+            </a:r>
+          </a:p>
+        </p:txBody>
+      </p:sp>
+      <p:sp>
+        <p:nvSpPr>
+          <p:cNvPr id="3" name="Oval 2">
             <a:extLst>
               <a:ext uri="{FF2B5EF4-FFF2-40B4-BE49-F238E27FC236}">
-                <a16:creationId xmlns:a16="http://schemas.microsoft.com/office/drawing/2014/main" id="{751F36EA-0928-48E1-A62E-70C58BE2C363}"/>
-              </a:ext>
-            </a:extLst>
-          </p:cNvPr>
-          <p:cNvSpPr>
-            <a:spLocks noGrp="1"/>
-          </p:cNvSpPr>
-          <p:nvPr>
-            <p:ph idx="1"/>
-          </p:nvPr>
-        </p:nvSpPr>
-        <p:spPr>
-          <a:xfrm>
-            <a:off x="357326" y="1484347"/>
-            <a:ext cx="4782845" cy="5271560"/>
-          </a:xfrm>
-        </p:spPr>
-        <p:txBody>
-          <a:bodyPr>
-            <a:noAutofit/>
-          </a:bodyPr>
-          <a:lstStyle/>
-          <a:p>
-            <a:pPr marL="0" indent="0">
-              <a:buNone/>
-            </a:pPr>
-            <a:r>
-              <a:rPr lang="en-US" sz="1000" dirty="0"/>
-              <a:t>/*</a:t>
-            </a:r>
-          </a:p>
-          <a:p>
-            <a:pPr marL="0" indent="0">
-              <a:buNone/>
-            </a:pPr>
-            <a:r>
-              <a:rPr lang="en-US" sz="1000" dirty="0"/>
-              <a:t>  SD card read/write</a:t>
-            </a:r>
-          </a:p>
-          <a:p>
-            <a:pPr marL="0" indent="0">
-              <a:buNone/>
-            </a:pPr>
-            <a:endParaRPr lang="en-US" sz="1000" dirty="0"/>
-          </a:p>
-          <a:p>
-            <a:pPr marL="0" indent="0">
-              <a:buNone/>
-            </a:pPr>
-            <a:r>
-              <a:rPr lang="en-US" sz="1000" dirty="0"/>
-              <a:t> This example shows how to read and write data to and from an SD card file</a:t>
-            </a:r>
-          </a:p>
-          <a:p>
-            <a:pPr marL="0" indent="0">
-              <a:buNone/>
-            </a:pPr>
-            <a:r>
-              <a:rPr lang="en-US" sz="1000" dirty="0"/>
-              <a:t> The circuit:</a:t>
-            </a:r>
-          </a:p>
-          <a:p>
-            <a:pPr marL="0" indent="0">
-              <a:buNone/>
-            </a:pPr>
-            <a:r>
-              <a:rPr lang="en-US" sz="1000" dirty="0"/>
-              <a:t> * SD card attached to SPI bus as follows:</a:t>
-            </a:r>
-          </a:p>
-          <a:p>
-            <a:pPr marL="0" indent="0">
-              <a:buNone/>
-            </a:pPr>
-            <a:r>
-              <a:rPr lang="en-US" sz="1000" dirty="0"/>
-              <a:t> ** MOSI - pin 11</a:t>
-            </a:r>
-          </a:p>
-          <a:p>
-            <a:pPr marL="0" indent="0">
-              <a:buNone/>
-            </a:pPr>
-            <a:r>
-              <a:rPr lang="en-US" sz="1000" dirty="0"/>
-              <a:t> ** MISO - pin 12</a:t>
-            </a:r>
-          </a:p>
-          <a:p>
-            <a:pPr marL="0" indent="0">
-              <a:buNone/>
-            </a:pPr>
-            <a:r>
-              <a:rPr lang="en-US" sz="1000" dirty="0"/>
-              <a:t> ** CLK - pin 13</a:t>
-            </a:r>
-          </a:p>
-          <a:p>
-            <a:pPr marL="0" indent="0">
-              <a:buNone/>
-            </a:pPr>
-            <a:r>
-              <a:rPr lang="en-US" sz="1000" dirty="0"/>
-              <a:t> ** CS - pin 4 (for </a:t>
-            </a:r>
-            <a:r>
-              <a:rPr lang="en-US" sz="1000" dirty="0" err="1"/>
-              <a:t>MKRZero</a:t>
-            </a:r>
-            <a:r>
-              <a:rPr lang="en-US" sz="1000" dirty="0"/>
-              <a:t> SD: SDCARD_SS_PIN)</a:t>
-            </a:r>
-          </a:p>
-          <a:p>
-            <a:pPr marL="0" indent="0">
-              <a:buNone/>
-            </a:pPr>
-            <a:r>
-              <a:rPr lang="en-US" sz="1000" dirty="0"/>
-              <a:t> */</a:t>
-            </a:r>
-          </a:p>
-          <a:p>
-            <a:pPr marL="0" indent="0">
-              <a:buNone/>
-            </a:pPr>
-            <a:r>
-              <a:rPr lang="en-US" sz="1000" dirty="0"/>
-              <a:t>#include &lt;</a:t>
-            </a:r>
-            <a:r>
-              <a:rPr lang="en-US" sz="1000" dirty="0" err="1"/>
-              <a:t>SPI.h</a:t>
-            </a:r>
-            <a:r>
-              <a:rPr lang="en-US" sz="1000" dirty="0"/>
-              <a:t>&gt;</a:t>
-            </a:r>
-          </a:p>
-          <a:p>
-            <a:pPr marL="0" indent="0">
-              <a:buNone/>
-            </a:pPr>
-            <a:r>
-              <a:rPr lang="en-US" sz="1000" dirty="0"/>
-              <a:t>#include &lt;</a:t>
-            </a:r>
-            <a:r>
-              <a:rPr lang="en-US" sz="1000" dirty="0" err="1"/>
-              <a:t>SD.h</a:t>
-            </a:r>
-            <a:r>
-              <a:rPr lang="en-US" sz="1000" dirty="0"/>
-              <a:t>&gt;</a:t>
-            </a:r>
-          </a:p>
-          <a:p>
-            <a:pPr marL="0" indent="0">
-              <a:buNone/>
-            </a:pPr>
-            <a:endParaRPr lang="en-US" sz="1000" dirty="0"/>
-          </a:p>
-          <a:p>
-            <a:pPr marL="0" indent="0">
-              <a:buNone/>
-            </a:pPr>
-            <a:r>
-              <a:rPr lang="en-US" sz="1000" dirty="0"/>
-              <a:t>File </a:t>
-            </a:r>
-            <a:r>
-              <a:rPr lang="en-US" sz="1000" dirty="0" err="1"/>
-              <a:t>myFile</a:t>
-            </a:r>
-            <a:r>
-              <a:rPr lang="en-US" sz="1000" dirty="0"/>
-              <a:t>;</a:t>
-            </a:r>
-          </a:p>
-          <a:p>
-            <a:pPr marL="0" indent="0">
-              <a:buNone/>
-            </a:pPr>
-            <a:endParaRPr lang="en-US" sz="1000" dirty="0"/>
-          </a:p>
-          <a:p>
-            <a:pPr marL="0" indent="0">
-              <a:buNone/>
-            </a:pPr>
-            <a:endParaRPr lang="en-US" sz="1000" dirty="0"/>
-          </a:p>
-        </p:txBody>
-      </p:sp>
-      <p:sp>
-        <p:nvSpPr>
-          <p:cNvPr id="4" name="Rectangle 3">
-            <a:extLst>
-              <a:ext uri="{FF2B5EF4-FFF2-40B4-BE49-F238E27FC236}">
-                <a16:creationId xmlns:a16="http://schemas.microsoft.com/office/drawing/2014/main" id="{956B92AA-B965-4551-9F32-4A0ECB413438}"/>
+                <a16:creationId xmlns:a16="http://schemas.microsoft.com/office/drawing/2014/main" id="{4E0D3AA4-98C0-4ACF-BAD3-DBB54635B232}"/>
               </a:ext>
             </a:extLst>
           </p:cNvPr>
@@ -6597,167 +6785,120 @@
         </p:nvSpPr>
         <p:spPr>
           <a:xfrm>
-            <a:off x="5631401" y="1933114"/>
-            <a:ext cx="6096000" cy="3485570"/>
-          </a:xfrm>
-          <a:prstGeom prst="rect">
+            <a:off x="552449" y="1076325"/>
+            <a:ext cx="2714625" cy="1791347"/>
+          </a:xfrm>
+          <a:prstGeom prst="ellipse">
             <a:avLst/>
           </a:prstGeom>
-        </p:spPr>
-        <p:txBody>
-          <a:bodyPr>
-            <a:spAutoFit/>
-          </a:bodyPr>
-          <a:lstStyle/>
-          <a:p>
-            <a:r>
-              <a:rPr lang="en-US" sz="1050" dirty="0"/>
-              <a:t>void </a:t>
-            </a:r>
-            <a:r>
-              <a:rPr lang="en-US" sz="1050" b="1" dirty="0"/>
-              <a:t>setup</a:t>
-            </a:r>
-            <a:r>
-              <a:rPr lang="en-US" sz="1050" dirty="0"/>
-              <a:t>() {</a:t>
-            </a:r>
-          </a:p>
-          <a:p>
-            <a:r>
-              <a:rPr lang="en-US" sz="1050" dirty="0"/>
-              <a:t>  // Open serial communications and wait for port to open:</a:t>
-            </a:r>
-          </a:p>
-          <a:p>
-            <a:r>
-              <a:rPr lang="en-US" sz="1050" dirty="0"/>
-              <a:t>  Serial.begin(115200);</a:t>
-            </a:r>
-          </a:p>
-          <a:p>
-            <a:r>
-              <a:rPr lang="en-US" sz="1050" dirty="0"/>
-              <a:t>  while (!Serial) {</a:t>
-            </a:r>
-          </a:p>
-          <a:p>
-            <a:r>
-              <a:rPr lang="en-US" sz="1050" dirty="0"/>
-              <a:t>    ; // wait for serial port to connect. Needed for native USB port only</a:t>
-            </a:r>
-          </a:p>
-          <a:p>
-            <a:r>
-              <a:rPr lang="en-US" sz="1050" dirty="0"/>
-              <a:t>  }</a:t>
-            </a:r>
-          </a:p>
-          <a:p>
-            <a:endParaRPr lang="en-US" sz="1050" dirty="0"/>
-          </a:p>
-          <a:p>
-            <a:endParaRPr lang="en-US" sz="1050" dirty="0"/>
-          </a:p>
-          <a:p>
-            <a:r>
-              <a:rPr lang="en-US" sz="1050" dirty="0"/>
-              <a:t>  Serial.print("Initializing SD card...");</a:t>
-            </a:r>
-          </a:p>
-          <a:p>
-            <a:endParaRPr lang="en-US" sz="1050" dirty="0"/>
-          </a:p>
-          <a:p>
-            <a:r>
-              <a:rPr lang="en-US" sz="1050" dirty="0"/>
-              <a:t>  if (!</a:t>
-            </a:r>
-            <a:r>
-              <a:rPr lang="en-US" sz="1050" dirty="0" err="1"/>
-              <a:t>SD.begin</a:t>
-            </a:r>
-            <a:r>
-              <a:rPr lang="en-US" sz="1050" dirty="0"/>
-              <a:t>(4)) {</a:t>
-            </a:r>
-          </a:p>
-          <a:p>
-            <a:r>
-              <a:rPr lang="en-US" sz="1050" dirty="0"/>
-              <a:t>    Serial.println("initialization failed!");</a:t>
-            </a:r>
-          </a:p>
-          <a:p>
-            <a:r>
-              <a:rPr lang="en-US" sz="1050" dirty="0"/>
-              <a:t>    while (1);</a:t>
-            </a:r>
-          </a:p>
-          <a:p>
-            <a:r>
-              <a:rPr lang="en-US" sz="1050" dirty="0"/>
-              <a:t>  }</a:t>
-            </a:r>
-          </a:p>
-          <a:p>
-            <a:r>
-              <a:rPr lang="en-US" sz="1050" dirty="0"/>
-              <a:t>  Serial.println("initialization done.");</a:t>
-            </a:r>
-          </a:p>
-          <a:p>
-            <a:endParaRPr lang="en-US" sz="1050" dirty="0"/>
-          </a:p>
-          <a:p>
-            <a:r>
-              <a:rPr lang="en-US" sz="1050" dirty="0"/>
-              <a:t>  // open the file. note that only one file can be open at a time,</a:t>
-            </a:r>
-          </a:p>
-          <a:p>
-            <a:r>
-              <a:rPr lang="en-US" sz="1050" dirty="0"/>
-              <a:t>  // so you have to close this one before opening another.</a:t>
-            </a:r>
-          </a:p>
-          <a:p>
-            <a:r>
-              <a:rPr lang="en-US" sz="1050" dirty="0"/>
-              <a:t>  </a:t>
-            </a:r>
-            <a:r>
-              <a:rPr lang="en-US" sz="1050" dirty="0" err="1"/>
-              <a:t>myFile</a:t>
-            </a:r>
-            <a:r>
-              <a:rPr lang="en-US" sz="1050" dirty="0"/>
-              <a:t> = </a:t>
-            </a:r>
-            <a:r>
-              <a:rPr lang="en-US" sz="1050" dirty="0" err="1"/>
-              <a:t>SD.open</a:t>
-            </a:r>
-            <a:r>
-              <a:rPr lang="en-US" sz="1050" dirty="0"/>
-              <a:t>("test.txt", FILE_WRITE);</a:t>
-            </a:r>
-          </a:p>
-          <a:p>
-            <a:endParaRPr lang="en-US" sz="1050" dirty="0"/>
-          </a:p>
-          <a:p>
-            <a:r>
-              <a:rPr lang="en-US" sz="1050" dirty="0"/>
-              <a:t> </a:t>
-            </a:r>
+          <a:noFill/>
+          <a:ln w="47625">
+            <a:solidFill>
+              <a:schemeClr val="accent3">
+                <a:lumMod val="60000"/>
+                <a:lumOff val="40000"/>
+              </a:schemeClr>
+            </a:solidFill>
+          </a:ln>
+          <a:scene3d>
+            <a:camera prst="orthographicFront"/>
+            <a:lightRig rig="threePt" dir="t"/>
+          </a:scene3d>
+          <a:sp3d>
+            <a:bevelT/>
+          </a:sp3d>
+        </p:spPr>
+        <p:style>
+          <a:lnRef idx="2">
+            <a:schemeClr val="accent1">
+              <a:shade val="50000"/>
+            </a:schemeClr>
+          </a:lnRef>
+          <a:fillRef idx="1">
+            <a:schemeClr val="accent1"/>
+          </a:fillRef>
+          <a:effectRef idx="0">
+            <a:schemeClr val="accent1"/>
+          </a:effectRef>
+          <a:fontRef idx="minor">
+            <a:schemeClr val="lt1"/>
+          </a:fontRef>
+        </p:style>
+        <p:txBody>
+          <a:bodyPr rtlCol="0" anchor="ctr"/>
+          <a:lstStyle/>
+          <a:p>
+            <a:pPr algn="ctr"/>
+            <a:endParaRPr lang="en-US" dirty="0"/>
+          </a:p>
+        </p:txBody>
+      </p:sp>
+      <p:sp>
+        <p:nvSpPr>
+          <p:cNvPr id="18" name="Oval 17">
+            <a:extLst>
+              <a:ext uri="{FF2B5EF4-FFF2-40B4-BE49-F238E27FC236}">
+                <a16:creationId xmlns:a16="http://schemas.microsoft.com/office/drawing/2014/main" id="{75107FCB-F019-42FC-A2A6-90B5C5B71E48}"/>
+              </a:ext>
+            </a:extLst>
+          </p:cNvPr>
+          <p:cNvSpPr/>
+          <p:nvPr/>
+        </p:nvSpPr>
+        <p:spPr>
+          <a:xfrm>
+            <a:off x="4810125" y="3009253"/>
+            <a:ext cx="1504950" cy="1791347"/>
+          </a:xfrm>
+          <a:prstGeom prst="ellipse">
+            <a:avLst/>
+          </a:prstGeom>
+          <a:noFill/>
+          <a:ln w="47625">
+            <a:solidFill>
+              <a:schemeClr val="accent3">
+                <a:lumMod val="60000"/>
+                <a:lumOff val="40000"/>
+              </a:schemeClr>
+            </a:solidFill>
+          </a:ln>
+          <a:scene3d>
+            <a:camera prst="orthographicFront"/>
+            <a:lightRig rig="threePt" dir="t"/>
+          </a:scene3d>
+          <a:sp3d>
+            <a:bevelT/>
+          </a:sp3d>
+        </p:spPr>
+        <p:style>
+          <a:lnRef idx="2">
+            <a:schemeClr val="accent1">
+              <a:shade val="50000"/>
+            </a:schemeClr>
+          </a:lnRef>
+          <a:fillRef idx="1">
+            <a:schemeClr val="accent1"/>
+          </a:fillRef>
+          <a:effectRef idx="0">
+            <a:schemeClr val="accent1"/>
+          </a:effectRef>
+          <a:fontRef idx="minor">
+            <a:schemeClr val="lt1"/>
+          </a:fontRef>
+        </p:style>
+        <p:txBody>
+          <a:bodyPr rtlCol="0" anchor="ctr"/>
+          <a:lstStyle/>
+          <a:p>
+            <a:pPr algn="ctr"/>
+            <a:endParaRPr lang="en-US" dirty="0"/>
           </a:p>
         </p:txBody>
       </p:sp>
     </p:spTree>
     <p:extLst>
       <p:ext uri="{BB962C8B-B14F-4D97-AF65-F5344CB8AC3E}">
-        <p14:creationId xmlns:p14="http://schemas.microsoft.com/office/powerpoint/2010/main" val="3500295217"/>
+        <p14:creationId xmlns:p14="http://schemas.microsoft.com/office/powerpoint/2010/main" val="3600324004"/>
       </p:ext>
     </p:extLst>
   </p:cSld>
@@ -6807,301 +6948,42 @@
           <a:p>
             <a:r>
               <a:rPr lang="en-US" dirty="0"/>
-              <a:t>Code – MMC R/W</a:t>
-            </a:r>
-          </a:p>
-        </p:txBody>
-      </p:sp>
-      <p:sp>
-        <p:nvSpPr>
-          <p:cNvPr id="4" name="Rectangle 3">
+              <a:t>Code – MMC R/W Using Shield</a:t>
+            </a:r>
+          </a:p>
+        </p:txBody>
+      </p:sp>
+      <p:sp>
+        <p:nvSpPr>
+          <p:cNvPr id="3" name="Content Placeholder 2">
             <a:extLst>
               <a:ext uri="{FF2B5EF4-FFF2-40B4-BE49-F238E27FC236}">
-                <a16:creationId xmlns:a16="http://schemas.microsoft.com/office/drawing/2014/main" id="{956B92AA-B965-4551-9F32-4A0ECB413438}"/>
+                <a16:creationId xmlns:a16="http://schemas.microsoft.com/office/drawing/2014/main" id="{751F36EA-0928-48E1-A62E-70C58BE2C363}"/>
               </a:ext>
             </a:extLst>
           </p:cNvPr>
-          <p:cNvSpPr/>
-          <p:nvPr/>
-        </p:nvSpPr>
-        <p:spPr>
-          <a:xfrm>
-            <a:off x="429086" y="1506985"/>
-            <a:ext cx="5190479" cy="5170646"/>
-          </a:xfrm>
-          <a:prstGeom prst="rect">
-            <a:avLst/>
-          </a:prstGeom>
-        </p:spPr>
-        <p:txBody>
-          <a:bodyPr wrap="square">
-            <a:spAutoFit/>
+          <p:cNvSpPr>
+            <a:spLocks noGrp="1"/>
+          </p:cNvSpPr>
+          <p:nvPr>
+            <p:ph idx="1"/>
+          </p:nvPr>
+        </p:nvSpPr>
+        <p:spPr>
+          <a:xfrm>
+            <a:off x="357326" y="1484347"/>
+            <a:ext cx="4782845" cy="5271560"/>
+          </a:xfrm>
+        </p:spPr>
+        <p:txBody>
+          <a:bodyPr>
+            <a:noAutofit/>
           </a:bodyPr>
           <a:lstStyle/>
           <a:p>
-            <a:r>
-              <a:rPr lang="en-US" sz="1000" dirty="0"/>
-              <a:t>// if the file opened okay, write to it:</a:t>
-            </a:r>
-          </a:p>
-          <a:p>
-            <a:r>
-              <a:rPr lang="en-US" sz="1000" dirty="0"/>
-              <a:t>  if (</a:t>
-            </a:r>
-            <a:r>
-              <a:rPr lang="en-US" sz="1000" dirty="0" err="1"/>
-              <a:t>myFile</a:t>
-            </a:r>
-            <a:r>
-              <a:rPr lang="en-US" sz="1000" dirty="0"/>
-              <a:t>) {</a:t>
-            </a:r>
-          </a:p>
-          <a:p>
-            <a:r>
-              <a:rPr lang="en-US" sz="1000" dirty="0"/>
-              <a:t>    Serial.print("Writing to test.txt...");</a:t>
-            </a:r>
-          </a:p>
-          <a:p>
-            <a:r>
-              <a:rPr lang="en-US" sz="1000" dirty="0"/>
-              <a:t>    </a:t>
-            </a:r>
-            <a:r>
-              <a:rPr lang="en-US" sz="1000" dirty="0" err="1"/>
-              <a:t>myFile.println</a:t>
-            </a:r>
-            <a:r>
-              <a:rPr lang="en-US" sz="1000" dirty="0"/>
-              <a:t>("testing 1, 2, 3.");</a:t>
-            </a:r>
-          </a:p>
-          <a:p>
-            <a:r>
-              <a:rPr lang="en-US" sz="1000" dirty="0"/>
-              <a:t>    // close the file:</a:t>
-            </a:r>
-          </a:p>
-          <a:p>
-            <a:r>
-              <a:rPr lang="en-US" sz="1000" dirty="0"/>
-              <a:t>    </a:t>
-            </a:r>
-            <a:r>
-              <a:rPr lang="en-US" sz="1000" dirty="0" err="1"/>
-              <a:t>myFile.close</a:t>
-            </a:r>
-            <a:r>
-              <a:rPr lang="en-US" sz="1000" dirty="0"/>
-              <a:t>();</a:t>
-            </a:r>
-          </a:p>
-          <a:p>
-            <a:r>
-              <a:rPr lang="en-US" sz="1000" dirty="0"/>
-              <a:t>    Serial.println("done.");</a:t>
-            </a:r>
-          </a:p>
-          <a:p>
-            <a:r>
-              <a:rPr lang="en-US" sz="1000" dirty="0"/>
-              <a:t>  } else {</a:t>
-            </a:r>
-          </a:p>
-          <a:p>
-            <a:r>
-              <a:rPr lang="en-US" sz="1000" dirty="0"/>
-              <a:t>    // if the file didn't open, print an error:</a:t>
-            </a:r>
-          </a:p>
-          <a:p>
-            <a:r>
-              <a:rPr lang="en-US" sz="1000" dirty="0"/>
-              <a:t>    Serial.println("error opening test.txt");</a:t>
-            </a:r>
-          </a:p>
-          <a:p>
-            <a:r>
-              <a:rPr lang="en-US" sz="1000" dirty="0"/>
-              <a:t>  }</a:t>
-            </a:r>
-          </a:p>
-          <a:p>
-            <a:endParaRPr lang="en-US" sz="1000" dirty="0"/>
-          </a:p>
-          <a:p>
-            <a:r>
-              <a:rPr lang="en-US" sz="1000" dirty="0"/>
-              <a:t>  // re-open the file for reading:</a:t>
-            </a:r>
-          </a:p>
-          <a:p>
-            <a:r>
-              <a:rPr lang="en-US" sz="1000" dirty="0"/>
-              <a:t>  </a:t>
-            </a:r>
-            <a:r>
-              <a:rPr lang="en-US" sz="1000" dirty="0" err="1"/>
-              <a:t>myFile</a:t>
-            </a:r>
-            <a:r>
-              <a:rPr lang="en-US" sz="1000" dirty="0"/>
-              <a:t> = </a:t>
-            </a:r>
-            <a:r>
-              <a:rPr lang="en-US" sz="1000" dirty="0" err="1"/>
-              <a:t>SD.open</a:t>
-            </a:r>
-            <a:r>
-              <a:rPr lang="en-US" sz="1000" dirty="0"/>
-              <a:t>("test.txt");</a:t>
-            </a:r>
-          </a:p>
-          <a:p>
-            <a:r>
-              <a:rPr lang="en-US" sz="1000" dirty="0"/>
-              <a:t>  if (</a:t>
-            </a:r>
-            <a:r>
-              <a:rPr lang="en-US" sz="1000" dirty="0" err="1"/>
-              <a:t>myFile</a:t>
-            </a:r>
-            <a:r>
-              <a:rPr lang="en-US" sz="1000" dirty="0"/>
-              <a:t>) {</a:t>
-            </a:r>
-          </a:p>
-          <a:p>
-            <a:r>
-              <a:rPr lang="en-US" sz="1000" dirty="0"/>
-              <a:t>    Serial.println("test.txt:");</a:t>
-            </a:r>
-          </a:p>
-          <a:p>
-            <a:endParaRPr lang="en-US" sz="1000" dirty="0"/>
-          </a:p>
-          <a:p>
-            <a:r>
-              <a:rPr lang="en-US" sz="1000" dirty="0"/>
-              <a:t>    // read from the file until there's nothing else in it:</a:t>
-            </a:r>
-          </a:p>
-          <a:p>
-            <a:r>
-              <a:rPr lang="en-US" sz="1000" dirty="0"/>
-              <a:t>    while (</a:t>
-            </a:r>
-            <a:r>
-              <a:rPr lang="en-US" sz="1000" dirty="0" err="1"/>
-              <a:t>myFile.available</a:t>
-            </a:r>
-            <a:r>
-              <a:rPr lang="en-US" sz="1000" dirty="0"/>
-              <a:t>()) {</a:t>
-            </a:r>
-          </a:p>
-          <a:p>
-            <a:r>
-              <a:rPr lang="en-US" sz="1000" dirty="0"/>
-              <a:t>      </a:t>
-            </a:r>
-            <a:r>
-              <a:rPr lang="en-US" sz="1000" dirty="0" err="1"/>
-              <a:t>Serial.write</a:t>
-            </a:r>
-            <a:r>
-              <a:rPr lang="en-US" sz="1000" dirty="0"/>
-              <a:t>(</a:t>
-            </a:r>
-            <a:r>
-              <a:rPr lang="en-US" sz="1000" dirty="0" err="1"/>
-              <a:t>myFile.read</a:t>
-            </a:r>
-            <a:r>
-              <a:rPr lang="en-US" sz="1000" dirty="0"/>
-              <a:t>());</a:t>
-            </a:r>
-          </a:p>
-          <a:p>
-            <a:r>
-              <a:rPr lang="en-US" sz="1000" dirty="0"/>
-              <a:t>    }</a:t>
-            </a:r>
-          </a:p>
-          <a:p>
-            <a:r>
-              <a:rPr lang="en-US" sz="1000" dirty="0"/>
-              <a:t>    // close the file:</a:t>
-            </a:r>
-          </a:p>
-          <a:p>
-            <a:r>
-              <a:rPr lang="en-US" sz="1000" dirty="0"/>
-              <a:t>    </a:t>
-            </a:r>
-            <a:r>
-              <a:rPr lang="en-US" sz="1000" dirty="0" err="1"/>
-              <a:t>myFile.close</a:t>
-            </a:r>
-            <a:r>
-              <a:rPr lang="en-US" sz="1000" dirty="0"/>
-              <a:t>();</a:t>
-            </a:r>
-          </a:p>
-          <a:p>
-            <a:r>
-              <a:rPr lang="en-US" sz="1000" dirty="0"/>
-              <a:t>  } else {</a:t>
-            </a:r>
-          </a:p>
-          <a:p>
-            <a:r>
-              <a:rPr lang="en-US" sz="1000" dirty="0"/>
-              <a:t>    // if the file didn't open, print an error:</a:t>
-            </a:r>
-          </a:p>
-          <a:p>
-            <a:r>
-              <a:rPr lang="en-US" sz="1000" dirty="0"/>
-              <a:t>    Serial.println("error opening test.txt");</a:t>
-            </a:r>
-          </a:p>
-          <a:p>
-            <a:r>
-              <a:rPr lang="en-US" sz="1000" dirty="0"/>
-              <a:t>  }</a:t>
-            </a:r>
-          </a:p>
-          <a:p>
-            <a:r>
-              <a:rPr lang="en-US" sz="1000" dirty="0"/>
-              <a:t>}</a:t>
-            </a:r>
-          </a:p>
-          <a:p>
-            <a:endParaRPr lang="en-US" sz="1000" dirty="0"/>
-          </a:p>
-          <a:p>
-            <a:r>
-              <a:rPr lang="en-US" sz="1000" dirty="0"/>
-              <a:t>void loop() {</a:t>
-            </a:r>
-          </a:p>
-          <a:p>
-            <a:r>
-              <a:rPr lang="en-US" sz="1000" dirty="0"/>
-              <a:t>  // nothing happens after setup</a:t>
-            </a:r>
-          </a:p>
-          <a:p>
-            <a:r>
-              <a:rPr lang="en-US" sz="1000" dirty="0"/>
-              <a:t>}</a:t>
-            </a:r>
-          </a:p>
-          <a:p>
+            <a:pPr marL="0" indent="0">
+              <a:buNone/>
+            </a:pPr>
             <a:endParaRPr lang="en-US" sz="1000" dirty="0"/>
           </a:p>
         </p:txBody>
@@ -7109,7 +6991,7 @@
     </p:spTree>
     <p:extLst>
       <p:ext uri="{BB962C8B-B14F-4D97-AF65-F5344CB8AC3E}">
-        <p14:creationId xmlns:p14="http://schemas.microsoft.com/office/powerpoint/2010/main" val="595431508"/>
+        <p14:creationId xmlns:p14="http://schemas.microsoft.com/office/powerpoint/2010/main" val="3500295217"/>
       </p:ext>
     </p:extLst>
   </p:cSld>
@@ -7141,6 +7023,64 @@
           <p:cNvPr id="2" name="Title 1">
             <a:extLst>
               <a:ext uri="{FF2B5EF4-FFF2-40B4-BE49-F238E27FC236}">
+                <a16:creationId xmlns:a16="http://schemas.microsoft.com/office/drawing/2014/main" id="{A459E8BF-0FF2-4C76-8952-3960E75A89F1}"/>
+              </a:ext>
+            </a:extLst>
+          </p:cNvPr>
+          <p:cNvSpPr>
+            <a:spLocks noGrp="1"/>
+          </p:cNvSpPr>
+          <p:nvPr>
+            <p:ph type="title"/>
+          </p:nvPr>
+        </p:nvSpPr>
+        <p:spPr/>
+        <p:txBody>
+          <a:bodyPr/>
+          <a:lstStyle/>
+          <a:p>
+            <a:r>
+              <a:rPr lang="en-US" dirty="0"/>
+              <a:t>Code – MMC R/W Using Shield</a:t>
+            </a:r>
+          </a:p>
+        </p:txBody>
+      </p:sp>
+    </p:spTree>
+    <p:extLst>
+      <p:ext uri="{BB962C8B-B14F-4D97-AF65-F5344CB8AC3E}">
+        <p14:creationId xmlns:p14="http://schemas.microsoft.com/office/powerpoint/2010/main" val="595431508"/>
+      </p:ext>
+    </p:extLst>
+  </p:cSld>
+  <p:clrMapOvr>
+    <a:masterClrMapping/>
+  </p:clrMapOvr>
+</p:sld>
+</file>
+
+<file path=ppt/slides/slide8.xml><?xml version="1.0" encoding="utf-8"?>
+<p:sld xmlns:a="http://schemas.openxmlformats.org/drawingml/2006/main" xmlns:r="http://schemas.openxmlformats.org/officeDocument/2006/relationships" xmlns:p="http://schemas.openxmlformats.org/presentationml/2006/main">
+  <p:cSld>
+    <p:spTree>
+      <p:nvGrpSpPr>
+        <p:cNvPr id="1" name=""/>
+        <p:cNvGrpSpPr/>
+        <p:nvPr/>
+      </p:nvGrpSpPr>
+      <p:grpSpPr>
+        <a:xfrm>
+          <a:off x="0" y="0"/>
+          <a:ext cx="0" cy="0"/>
+          <a:chOff x="0" y="0"/>
+          <a:chExt cx="0" cy="0"/>
+        </a:xfrm>
+      </p:grpSpPr>
+      <p:sp>
+        <p:nvSpPr>
+          <p:cNvPr id="2" name="Title 1">
+            <a:extLst>
+              <a:ext uri="{FF2B5EF4-FFF2-40B4-BE49-F238E27FC236}">
                 <a16:creationId xmlns:a16="http://schemas.microsoft.com/office/drawing/2014/main" id="{96B42ADA-6770-402C-9F0B-A3C5159885CA}"/>
               </a:ext>
             </a:extLst>
@@ -7168,6 +7108,306 @@
     <p:extLst>
       <p:ext uri="{BB962C8B-B14F-4D97-AF65-F5344CB8AC3E}">
         <p14:creationId xmlns:p14="http://schemas.microsoft.com/office/powerpoint/2010/main" val="2500575355"/>
+      </p:ext>
+    </p:extLst>
+  </p:cSld>
+  <p:clrMapOvr>
+    <a:masterClrMapping/>
+  </p:clrMapOvr>
+</p:sld>
+</file>
+
+<file path=ppt/slides/slide9.xml><?xml version="1.0" encoding="utf-8"?>
+<p:sld xmlns:a="http://schemas.openxmlformats.org/drawingml/2006/main" xmlns:r="http://schemas.openxmlformats.org/officeDocument/2006/relationships" xmlns:p="http://schemas.openxmlformats.org/presentationml/2006/main">
+  <p:cSld>
+    <p:spTree>
+      <p:nvGrpSpPr>
+        <p:cNvPr id="1" name=""/>
+        <p:cNvGrpSpPr/>
+        <p:nvPr/>
+      </p:nvGrpSpPr>
+      <p:grpSpPr>
+        <a:xfrm>
+          <a:off x="0" y="0"/>
+          <a:ext cx="0" cy="0"/>
+          <a:chOff x="0" y="0"/>
+          <a:chExt cx="0" cy="0"/>
+        </a:xfrm>
+      </p:grpSpPr>
+      <p:sp>
+        <p:nvSpPr>
+          <p:cNvPr id="2" name="Title 1">
+            <a:extLst>
+              <a:ext uri="{FF2B5EF4-FFF2-40B4-BE49-F238E27FC236}">
+                <a16:creationId xmlns:a16="http://schemas.microsoft.com/office/drawing/2014/main" id="{96B42ADA-6770-402C-9F0B-A3C5159885CA}"/>
+              </a:ext>
+            </a:extLst>
+          </p:cNvPr>
+          <p:cNvSpPr>
+            <a:spLocks noGrp="1"/>
+          </p:cNvSpPr>
+          <p:nvPr>
+            <p:ph type="title"/>
+          </p:nvPr>
+        </p:nvSpPr>
+        <p:spPr/>
+        <p:txBody>
+          <a:bodyPr/>
+          <a:lstStyle/>
+          <a:p>
+            <a:r>
+              <a:rPr lang="en-US" dirty="0"/>
+              <a:t>Where to buy</a:t>
+            </a:r>
+          </a:p>
+        </p:txBody>
+      </p:sp>
+      <p:pic>
+        <p:nvPicPr>
+          <p:cNvPr id="2050" name="Picture 2" descr="https://robu.in/wp-content/uploads/2016/03/New-Data-Logger-Module-Logging-Recorder-Shield-V1-0-for-Arduino-UNO-SD-Card.jpg_640x640.jpg">
+            <a:extLst>
+              <a:ext uri="{FF2B5EF4-FFF2-40B4-BE49-F238E27FC236}">
+                <a16:creationId xmlns:a16="http://schemas.microsoft.com/office/drawing/2014/main" id="{F4259B91-3AF6-4384-B9FA-8DCA02EEC9E8}"/>
+              </a:ext>
+            </a:extLst>
+          </p:cNvPr>
+          <p:cNvPicPr>
+            <a:picLocks noChangeAspect="1" noChangeArrowheads="1"/>
+          </p:cNvPicPr>
+          <p:nvPr/>
+        </p:nvPicPr>
+        <p:blipFill>
+          <a:blip r:embed="rId2">
+            <a:extLst>
+              <a:ext uri="{28A0092B-C50C-407E-A947-70E740481C1C}">
+                <a14:useLocalDpi xmlns:a14="http://schemas.microsoft.com/office/drawing/2010/main" val="0"/>
+              </a:ext>
+            </a:extLst>
+          </a:blip>
+          <a:srcRect/>
+          <a:stretch>
+            <a:fillRect/>
+          </a:stretch>
+        </p:blipFill>
+        <p:spPr bwMode="auto">
+          <a:xfrm>
+            <a:off x="419100" y="1410887"/>
+            <a:ext cx="4125292" cy="4125292"/>
+          </a:xfrm>
+          <a:prstGeom prst="rect">
+            <a:avLst/>
+          </a:prstGeom>
+          <a:noFill/>
+          <a:extLst>
+            <a:ext uri="{909E8E84-426E-40DD-AFC4-6F175D3DCCD1}">
+              <a14:hiddenFill xmlns:a14="http://schemas.microsoft.com/office/drawing/2010/main">
+                <a:solidFill>
+                  <a:srgbClr val="FFFFFF"/>
+                </a:solidFill>
+              </a14:hiddenFill>
+            </a:ext>
+          </a:extLst>
+        </p:spPr>
+      </p:pic>
+      <p:sp>
+        <p:nvSpPr>
+          <p:cNvPr id="4" name="Rectangle 3">
+            <a:extLst>
+              <a:ext uri="{FF2B5EF4-FFF2-40B4-BE49-F238E27FC236}">
+                <a16:creationId xmlns:a16="http://schemas.microsoft.com/office/drawing/2014/main" id="{10889E3F-9CD8-43B1-AC78-DEAF61F1FB80}"/>
+              </a:ext>
+            </a:extLst>
+          </p:cNvPr>
+          <p:cNvSpPr/>
+          <p:nvPr/>
+        </p:nvSpPr>
+        <p:spPr>
+          <a:xfrm>
+            <a:off x="419100" y="5859527"/>
+            <a:ext cx="6096000" cy="646331"/>
+          </a:xfrm>
+          <a:prstGeom prst="rect">
+            <a:avLst/>
+          </a:prstGeom>
+        </p:spPr>
+        <p:txBody>
+          <a:bodyPr>
+            <a:spAutoFit/>
+          </a:bodyPr>
+          <a:lstStyle/>
+          <a:p>
+            <a:r>
+              <a:rPr lang="en-US" dirty="0">
+                <a:hlinkClick r:id="rId3"/>
+              </a:rPr>
+              <a:t>https://robu.in/product/data-logger-module-logging-shield-data-recorder-shield/</a:t>
+            </a:r>
+            <a:endParaRPr lang="en-US" dirty="0"/>
+          </a:p>
+        </p:txBody>
+      </p:sp>
+      <p:pic>
+        <p:nvPicPr>
+          <p:cNvPr id="2052" name="Picture 4" descr="https://robu.in/wp-content/uploads/2016/03/Micro-SD-Card-Reader-Module-2.jpg">
+            <a:extLst>
+              <a:ext uri="{FF2B5EF4-FFF2-40B4-BE49-F238E27FC236}">
+                <a16:creationId xmlns:a16="http://schemas.microsoft.com/office/drawing/2014/main" id="{C82D4C66-C4C4-4A05-844A-229D5DCA1F49}"/>
+              </a:ext>
+            </a:extLst>
+          </p:cNvPr>
+          <p:cNvPicPr>
+            <a:picLocks noChangeAspect="1" noChangeArrowheads="1"/>
+          </p:cNvPicPr>
+          <p:nvPr/>
+        </p:nvPicPr>
+        <p:blipFill>
+          <a:blip r:embed="rId4">
+            <a:extLst>
+              <a:ext uri="{28A0092B-C50C-407E-A947-70E740481C1C}">
+                <a14:useLocalDpi xmlns:a14="http://schemas.microsoft.com/office/drawing/2010/main" val="0"/>
+              </a:ext>
+            </a:extLst>
+          </a:blip>
+          <a:srcRect/>
+          <a:stretch>
+            <a:fillRect/>
+          </a:stretch>
+        </p:blipFill>
+        <p:spPr bwMode="auto">
+          <a:xfrm>
+            <a:off x="7236627" y="2057401"/>
+            <a:ext cx="4269573" cy="4269573"/>
+          </a:xfrm>
+          <a:prstGeom prst="rect">
+            <a:avLst/>
+          </a:prstGeom>
+          <a:noFill/>
+          <a:extLst>
+            <a:ext uri="{909E8E84-426E-40DD-AFC4-6F175D3DCCD1}">
+              <a14:hiddenFill xmlns:a14="http://schemas.microsoft.com/office/drawing/2010/main">
+                <a:solidFill>
+                  <a:srgbClr val="FFFFFF"/>
+                </a:solidFill>
+              </a14:hiddenFill>
+            </a:ext>
+          </a:extLst>
+        </p:spPr>
+      </p:pic>
+      <p:sp>
+        <p:nvSpPr>
+          <p:cNvPr id="5" name="Rectangle 4">
+            <a:extLst>
+              <a:ext uri="{FF2B5EF4-FFF2-40B4-BE49-F238E27FC236}">
+                <a16:creationId xmlns:a16="http://schemas.microsoft.com/office/drawing/2014/main" id="{81ED98FB-83CD-4F66-9690-1F4F59CDAE71}"/>
+              </a:ext>
+            </a:extLst>
+          </p:cNvPr>
+          <p:cNvSpPr/>
+          <p:nvPr/>
+        </p:nvSpPr>
+        <p:spPr>
+          <a:xfrm>
+            <a:off x="6515100" y="2149190"/>
+            <a:ext cx="3264420" cy="369332"/>
+          </a:xfrm>
+          <a:prstGeom prst="rect">
+            <a:avLst/>
+          </a:prstGeom>
+        </p:spPr>
+        <p:txBody>
+          <a:bodyPr wrap="none">
+            <a:spAutoFit/>
+          </a:bodyPr>
+          <a:lstStyle/>
+          <a:p>
+            <a:r>
+              <a:rPr lang="en-US" dirty="0">
+                <a:latin typeface="Lucida Grande"/>
+              </a:rPr>
+              <a:t>Micro SD Card Reader Module</a:t>
+            </a:r>
+            <a:endParaRPr lang="en-US" dirty="0"/>
+          </a:p>
+        </p:txBody>
+      </p:sp>
+      <p:sp>
+        <p:nvSpPr>
+          <p:cNvPr id="6" name="Rectangle 5">
+            <a:extLst>
+              <a:ext uri="{FF2B5EF4-FFF2-40B4-BE49-F238E27FC236}">
+                <a16:creationId xmlns:a16="http://schemas.microsoft.com/office/drawing/2014/main" id="{7C6DC232-4B90-47B6-B112-18ED7C8789CB}"/>
+              </a:ext>
+            </a:extLst>
+          </p:cNvPr>
+          <p:cNvSpPr/>
+          <p:nvPr/>
+        </p:nvSpPr>
+        <p:spPr>
+          <a:xfrm>
+            <a:off x="6515100" y="2518522"/>
+            <a:ext cx="5480988" cy="369332"/>
+          </a:xfrm>
+          <a:prstGeom prst="rect">
+            <a:avLst/>
+          </a:prstGeom>
+        </p:spPr>
+        <p:txBody>
+          <a:bodyPr wrap="none">
+            <a:spAutoFit/>
+          </a:bodyPr>
+          <a:lstStyle/>
+          <a:p>
+            <a:r>
+              <a:rPr lang="en-US" dirty="0">
+                <a:hlinkClick r:id="rId5"/>
+              </a:rPr>
+              <a:t>https://robu.in/product/micro-sd-card-module/</a:t>
+            </a:r>
+            <a:endParaRPr lang="en-US" dirty="0"/>
+          </a:p>
+        </p:txBody>
+      </p:sp>
+      <p:sp>
+        <p:nvSpPr>
+          <p:cNvPr id="3" name="Rectangle 2">
+            <a:extLst>
+              <a:ext uri="{FF2B5EF4-FFF2-40B4-BE49-F238E27FC236}">
+                <a16:creationId xmlns:a16="http://schemas.microsoft.com/office/drawing/2014/main" id="{FA031CB6-1866-4648-8FB6-D73770449679}"/>
+              </a:ext>
+            </a:extLst>
+          </p:cNvPr>
+          <p:cNvSpPr/>
+          <p:nvPr/>
+        </p:nvSpPr>
+        <p:spPr>
+          <a:xfrm>
+            <a:off x="419100" y="5472844"/>
+            <a:ext cx="7073900" cy="369332"/>
+          </a:xfrm>
+          <a:prstGeom prst="rect">
+            <a:avLst/>
+          </a:prstGeom>
+        </p:spPr>
+        <p:txBody>
+          <a:bodyPr wrap="square">
+            <a:spAutoFit/>
+          </a:bodyPr>
+          <a:lstStyle/>
+          <a:p>
+            <a:r>
+              <a:rPr lang="en-US" dirty="0">
+                <a:latin typeface="Lucida Grande"/>
+              </a:rPr>
+              <a:t>Data Logger module Logging Shield data Recorder Shield (with RTC)</a:t>
+            </a:r>
+            <a:endParaRPr lang="en-US" dirty="0"/>
+          </a:p>
+        </p:txBody>
+      </p:sp>
+    </p:spTree>
+    <p:extLst>
+      <p:ext uri="{BB962C8B-B14F-4D97-AF65-F5344CB8AC3E}">
+        <p14:creationId xmlns:p14="http://schemas.microsoft.com/office/powerpoint/2010/main" val="2457038222"/>
       </p:ext>
     </p:extLst>
   </p:cSld>

</xml_diff>

<commit_message>
Custom Projects:  Added RTC DS1307 & EEPROM project
</commit_message>
<xml_diff>
--- a/custom_projects/01_MicroSdCardInterfacing/01_MicroSdCardInterfacing.pptx
+++ b/custom_projects/01_MicroSdCardInterfacing/01_MicroSdCardInterfacing.pptx
@@ -12,8 +12,9 @@
     <p:sldId id="266" r:id="rId6"/>
     <p:sldId id="261" r:id="rId7"/>
     <p:sldId id="264" r:id="rId8"/>
-    <p:sldId id="263" r:id="rId9"/>
-    <p:sldId id="265" r:id="rId10"/>
+    <p:sldId id="267" r:id="rId9"/>
+    <p:sldId id="263" r:id="rId10"/>
+    <p:sldId id="265" r:id="rId11"/>
   </p:sldIdLst>
   <p:sldSz cx="12192000" cy="6858000"/>
   <p:notesSz cx="6858000" cy="9144000"/>
@@ -5739,6 +5740,306 @@
 </p:sld>
 </file>
 
+<file path=ppt/slides/slide10.xml><?xml version="1.0" encoding="utf-8"?>
+<p:sld xmlns:a="http://schemas.openxmlformats.org/drawingml/2006/main" xmlns:r="http://schemas.openxmlformats.org/officeDocument/2006/relationships" xmlns:p="http://schemas.openxmlformats.org/presentationml/2006/main">
+  <p:cSld>
+    <p:spTree>
+      <p:nvGrpSpPr>
+        <p:cNvPr id="1" name=""/>
+        <p:cNvGrpSpPr/>
+        <p:nvPr/>
+      </p:nvGrpSpPr>
+      <p:grpSpPr>
+        <a:xfrm>
+          <a:off x="0" y="0"/>
+          <a:ext cx="0" cy="0"/>
+          <a:chOff x="0" y="0"/>
+          <a:chExt cx="0" cy="0"/>
+        </a:xfrm>
+      </p:grpSpPr>
+      <p:sp>
+        <p:nvSpPr>
+          <p:cNvPr id="2" name="Title 1">
+            <a:extLst>
+              <a:ext uri="{FF2B5EF4-FFF2-40B4-BE49-F238E27FC236}">
+                <a16:creationId xmlns:a16="http://schemas.microsoft.com/office/drawing/2014/main" id="{96B42ADA-6770-402C-9F0B-A3C5159885CA}"/>
+              </a:ext>
+            </a:extLst>
+          </p:cNvPr>
+          <p:cNvSpPr>
+            <a:spLocks noGrp="1"/>
+          </p:cNvSpPr>
+          <p:nvPr>
+            <p:ph type="title"/>
+          </p:nvPr>
+        </p:nvSpPr>
+        <p:spPr/>
+        <p:txBody>
+          <a:bodyPr/>
+          <a:lstStyle/>
+          <a:p>
+            <a:r>
+              <a:rPr lang="en-US" dirty="0"/>
+              <a:t>Where to buy</a:t>
+            </a:r>
+          </a:p>
+        </p:txBody>
+      </p:sp>
+      <p:pic>
+        <p:nvPicPr>
+          <p:cNvPr id="2050" name="Picture 2" descr="https://robu.in/wp-content/uploads/2016/03/New-Data-Logger-Module-Logging-Recorder-Shield-V1-0-for-Arduino-UNO-SD-Card.jpg_640x640.jpg">
+            <a:extLst>
+              <a:ext uri="{FF2B5EF4-FFF2-40B4-BE49-F238E27FC236}">
+                <a16:creationId xmlns:a16="http://schemas.microsoft.com/office/drawing/2014/main" id="{F4259B91-3AF6-4384-B9FA-8DCA02EEC9E8}"/>
+              </a:ext>
+            </a:extLst>
+          </p:cNvPr>
+          <p:cNvPicPr>
+            <a:picLocks noChangeAspect="1" noChangeArrowheads="1"/>
+          </p:cNvPicPr>
+          <p:nvPr/>
+        </p:nvPicPr>
+        <p:blipFill>
+          <a:blip r:embed="rId2">
+            <a:extLst>
+              <a:ext uri="{28A0092B-C50C-407E-A947-70E740481C1C}">
+                <a14:useLocalDpi xmlns:a14="http://schemas.microsoft.com/office/drawing/2010/main" val="0"/>
+              </a:ext>
+            </a:extLst>
+          </a:blip>
+          <a:srcRect/>
+          <a:stretch>
+            <a:fillRect/>
+          </a:stretch>
+        </p:blipFill>
+        <p:spPr bwMode="auto">
+          <a:xfrm>
+            <a:off x="419100" y="1410887"/>
+            <a:ext cx="4125292" cy="4125292"/>
+          </a:xfrm>
+          <a:prstGeom prst="rect">
+            <a:avLst/>
+          </a:prstGeom>
+          <a:noFill/>
+          <a:extLst>
+            <a:ext uri="{909E8E84-426E-40DD-AFC4-6F175D3DCCD1}">
+              <a14:hiddenFill xmlns:a14="http://schemas.microsoft.com/office/drawing/2010/main">
+                <a:solidFill>
+                  <a:srgbClr val="FFFFFF"/>
+                </a:solidFill>
+              </a14:hiddenFill>
+            </a:ext>
+          </a:extLst>
+        </p:spPr>
+      </p:pic>
+      <p:sp>
+        <p:nvSpPr>
+          <p:cNvPr id="4" name="Rectangle 3">
+            <a:extLst>
+              <a:ext uri="{FF2B5EF4-FFF2-40B4-BE49-F238E27FC236}">
+                <a16:creationId xmlns:a16="http://schemas.microsoft.com/office/drawing/2014/main" id="{10889E3F-9CD8-43B1-AC78-DEAF61F1FB80}"/>
+              </a:ext>
+            </a:extLst>
+          </p:cNvPr>
+          <p:cNvSpPr/>
+          <p:nvPr/>
+        </p:nvSpPr>
+        <p:spPr>
+          <a:xfrm>
+            <a:off x="419100" y="5859527"/>
+            <a:ext cx="6096000" cy="646331"/>
+          </a:xfrm>
+          <a:prstGeom prst="rect">
+            <a:avLst/>
+          </a:prstGeom>
+        </p:spPr>
+        <p:txBody>
+          <a:bodyPr>
+            <a:spAutoFit/>
+          </a:bodyPr>
+          <a:lstStyle/>
+          <a:p>
+            <a:r>
+              <a:rPr lang="en-US" dirty="0">
+                <a:hlinkClick r:id="rId3"/>
+              </a:rPr>
+              <a:t>https://robu.in/product/data-logger-module-logging-shield-data-recorder-shield/</a:t>
+            </a:r>
+            <a:endParaRPr lang="en-US" dirty="0"/>
+          </a:p>
+        </p:txBody>
+      </p:sp>
+      <p:pic>
+        <p:nvPicPr>
+          <p:cNvPr id="2052" name="Picture 4" descr="https://robu.in/wp-content/uploads/2016/03/Micro-SD-Card-Reader-Module-2.jpg">
+            <a:extLst>
+              <a:ext uri="{FF2B5EF4-FFF2-40B4-BE49-F238E27FC236}">
+                <a16:creationId xmlns:a16="http://schemas.microsoft.com/office/drawing/2014/main" id="{C82D4C66-C4C4-4A05-844A-229D5DCA1F49}"/>
+              </a:ext>
+            </a:extLst>
+          </p:cNvPr>
+          <p:cNvPicPr>
+            <a:picLocks noChangeAspect="1" noChangeArrowheads="1"/>
+          </p:cNvPicPr>
+          <p:nvPr/>
+        </p:nvPicPr>
+        <p:blipFill>
+          <a:blip r:embed="rId4">
+            <a:extLst>
+              <a:ext uri="{28A0092B-C50C-407E-A947-70E740481C1C}">
+                <a14:useLocalDpi xmlns:a14="http://schemas.microsoft.com/office/drawing/2010/main" val="0"/>
+              </a:ext>
+            </a:extLst>
+          </a:blip>
+          <a:srcRect/>
+          <a:stretch>
+            <a:fillRect/>
+          </a:stretch>
+        </p:blipFill>
+        <p:spPr bwMode="auto">
+          <a:xfrm>
+            <a:off x="7236627" y="2057401"/>
+            <a:ext cx="4269573" cy="4269573"/>
+          </a:xfrm>
+          <a:prstGeom prst="rect">
+            <a:avLst/>
+          </a:prstGeom>
+          <a:noFill/>
+          <a:extLst>
+            <a:ext uri="{909E8E84-426E-40DD-AFC4-6F175D3DCCD1}">
+              <a14:hiddenFill xmlns:a14="http://schemas.microsoft.com/office/drawing/2010/main">
+                <a:solidFill>
+                  <a:srgbClr val="FFFFFF"/>
+                </a:solidFill>
+              </a14:hiddenFill>
+            </a:ext>
+          </a:extLst>
+        </p:spPr>
+      </p:pic>
+      <p:sp>
+        <p:nvSpPr>
+          <p:cNvPr id="5" name="Rectangle 4">
+            <a:extLst>
+              <a:ext uri="{FF2B5EF4-FFF2-40B4-BE49-F238E27FC236}">
+                <a16:creationId xmlns:a16="http://schemas.microsoft.com/office/drawing/2014/main" id="{81ED98FB-83CD-4F66-9690-1F4F59CDAE71}"/>
+              </a:ext>
+            </a:extLst>
+          </p:cNvPr>
+          <p:cNvSpPr/>
+          <p:nvPr/>
+        </p:nvSpPr>
+        <p:spPr>
+          <a:xfrm>
+            <a:off x="6515100" y="2149190"/>
+            <a:ext cx="3264420" cy="369332"/>
+          </a:xfrm>
+          <a:prstGeom prst="rect">
+            <a:avLst/>
+          </a:prstGeom>
+        </p:spPr>
+        <p:txBody>
+          <a:bodyPr wrap="none">
+            <a:spAutoFit/>
+          </a:bodyPr>
+          <a:lstStyle/>
+          <a:p>
+            <a:r>
+              <a:rPr lang="en-US" dirty="0">
+                <a:latin typeface="Lucida Grande"/>
+              </a:rPr>
+              <a:t>Micro SD Card Reader Module</a:t>
+            </a:r>
+            <a:endParaRPr lang="en-US" dirty="0"/>
+          </a:p>
+        </p:txBody>
+      </p:sp>
+      <p:sp>
+        <p:nvSpPr>
+          <p:cNvPr id="6" name="Rectangle 5">
+            <a:extLst>
+              <a:ext uri="{FF2B5EF4-FFF2-40B4-BE49-F238E27FC236}">
+                <a16:creationId xmlns:a16="http://schemas.microsoft.com/office/drawing/2014/main" id="{7C6DC232-4B90-47B6-B112-18ED7C8789CB}"/>
+              </a:ext>
+            </a:extLst>
+          </p:cNvPr>
+          <p:cNvSpPr/>
+          <p:nvPr/>
+        </p:nvSpPr>
+        <p:spPr>
+          <a:xfrm>
+            <a:off x="6515100" y="2518522"/>
+            <a:ext cx="5480988" cy="369332"/>
+          </a:xfrm>
+          <a:prstGeom prst="rect">
+            <a:avLst/>
+          </a:prstGeom>
+        </p:spPr>
+        <p:txBody>
+          <a:bodyPr wrap="none">
+            <a:spAutoFit/>
+          </a:bodyPr>
+          <a:lstStyle/>
+          <a:p>
+            <a:r>
+              <a:rPr lang="en-US" dirty="0">
+                <a:hlinkClick r:id="rId5"/>
+              </a:rPr>
+              <a:t>https://robu.in/product/micro-sd-card-module/</a:t>
+            </a:r>
+            <a:endParaRPr lang="en-US" dirty="0"/>
+          </a:p>
+        </p:txBody>
+      </p:sp>
+      <p:sp>
+        <p:nvSpPr>
+          <p:cNvPr id="3" name="Rectangle 2">
+            <a:extLst>
+              <a:ext uri="{FF2B5EF4-FFF2-40B4-BE49-F238E27FC236}">
+                <a16:creationId xmlns:a16="http://schemas.microsoft.com/office/drawing/2014/main" id="{FA031CB6-1866-4648-8FB6-D73770449679}"/>
+              </a:ext>
+            </a:extLst>
+          </p:cNvPr>
+          <p:cNvSpPr/>
+          <p:nvPr/>
+        </p:nvSpPr>
+        <p:spPr>
+          <a:xfrm>
+            <a:off x="419100" y="5472844"/>
+            <a:ext cx="7073900" cy="369332"/>
+          </a:xfrm>
+          <a:prstGeom prst="rect">
+            <a:avLst/>
+          </a:prstGeom>
+        </p:spPr>
+        <p:txBody>
+          <a:bodyPr wrap="square">
+            <a:spAutoFit/>
+          </a:bodyPr>
+          <a:lstStyle/>
+          <a:p>
+            <a:r>
+              <a:rPr lang="en-US" dirty="0">
+                <a:latin typeface="Lucida Grande"/>
+              </a:rPr>
+              <a:t>Data Logger module Logging Shield data Recorder Shield (with RTC)</a:t>
+            </a:r>
+            <a:endParaRPr lang="en-US" dirty="0"/>
+          </a:p>
+        </p:txBody>
+      </p:sp>
+    </p:spTree>
+    <p:extLst>
+      <p:ext uri="{BB962C8B-B14F-4D97-AF65-F5344CB8AC3E}">
+        <p14:creationId xmlns:p14="http://schemas.microsoft.com/office/powerpoint/2010/main" val="2457038222"/>
+      </p:ext>
+    </p:extLst>
+  </p:cSld>
+  <p:clrMapOvr>
+    <a:masterClrMapping/>
+  </p:clrMapOvr>
+</p:sld>
+</file>
+
 <file path=ppt/slides/slide2.xml><?xml version="1.0" encoding="utf-8"?>
 <p:sld xmlns:a="http://schemas.openxmlformats.org/drawingml/2006/main" xmlns:r="http://schemas.openxmlformats.org/officeDocument/2006/relationships" xmlns:p="http://schemas.openxmlformats.org/presentationml/2006/main">
   <p:cSld>
@@ -6240,143 +6541,12 @@
           <a:chExt cx="0" cy="0"/>
         </a:xfrm>
       </p:grpSpPr>
-      <p:sp>
-        <p:nvSpPr>
-          <p:cNvPr id="2" name="Title 1">
+      <p:pic>
+        <p:nvPicPr>
+          <p:cNvPr id="8" name="Picture 2" descr="https://robu.in/wp-content/uploads/2016/03/New-Data-Logger-Module-Logging-Recorder-Shield-V1-0-for-Arduino-UNO-SD-Card.jpg_640x640.jpg">
             <a:extLst>
               <a:ext uri="{FF2B5EF4-FFF2-40B4-BE49-F238E27FC236}">
-                <a16:creationId xmlns:a16="http://schemas.microsoft.com/office/drawing/2014/main" id="{F1776AEA-DA03-417F-8258-814B2F06E6BB}"/>
-              </a:ext>
-            </a:extLst>
-          </p:cNvPr>
-          <p:cNvSpPr>
-            <a:spLocks noGrp="1"/>
-          </p:cNvSpPr>
-          <p:nvPr>
-            <p:ph type="title"/>
-          </p:nvPr>
-        </p:nvSpPr>
-        <p:spPr/>
-        <p:txBody>
-          <a:bodyPr/>
-          <a:lstStyle/>
-          <a:p>
-            <a:r>
-              <a:rPr lang="en-US" dirty="0"/>
-              <a:t>Circuit</a:t>
-            </a:r>
-          </a:p>
-        </p:txBody>
-      </p:sp>
-      <p:sp>
-        <p:nvSpPr>
-          <p:cNvPr id="4" name="Rectangle 3">
-            <a:extLst>
-              <a:ext uri="{FF2B5EF4-FFF2-40B4-BE49-F238E27FC236}">
-                <a16:creationId xmlns:a16="http://schemas.microsoft.com/office/drawing/2014/main" id="{0A68AC33-568D-4580-8773-9C970024AB18}"/>
-              </a:ext>
-            </a:extLst>
-          </p:cNvPr>
-          <p:cNvSpPr/>
-          <p:nvPr/>
-        </p:nvSpPr>
-        <p:spPr>
-          <a:xfrm>
-            <a:off x="7406936" y="1864674"/>
-            <a:ext cx="4613429" cy="3416320"/>
-          </a:xfrm>
-          <a:prstGeom prst="rect">
-            <a:avLst/>
-          </a:prstGeom>
-        </p:spPr>
-        <p:txBody>
-          <a:bodyPr wrap="square">
-            <a:spAutoFit/>
-          </a:bodyPr>
-          <a:lstStyle/>
-          <a:p>
-            <a:pPr marL="285750" indent="-285750" algn="just">
-              <a:buFont typeface="Arial" panose="020B0604020202020204" pitchFamily="34" charset="0"/>
-              <a:buChar char="•"/>
-            </a:pPr>
-            <a:r>
-              <a:rPr lang="en-US" dirty="0"/>
-              <a:t>Connect VCC with 5V in the Arduino.</a:t>
-            </a:r>
-          </a:p>
-          <a:p>
-            <a:pPr marL="285750" indent="-285750" algn="just">
-              <a:buFont typeface="Arial" panose="020B0604020202020204" pitchFamily="34" charset="0"/>
-              <a:buChar char="•"/>
-            </a:pPr>
-            <a:r>
-              <a:rPr lang="en-US" dirty="0"/>
-              <a:t>Connect the GND of SD card to the ground of Arduino.</a:t>
-            </a:r>
-          </a:p>
-          <a:p>
-            <a:pPr marL="285750" indent="-285750" algn="just">
-              <a:buFont typeface="Arial" panose="020B0604020202020204" pitchFamily="34" charset="0"/>
-              <a:buChar char="•"/>
-            </a:pPr>
-            <a:r>
-              <a:rPr lang="en-US" dirty="0"/>
-              <a:t>Connect CS to pin 10 / 4 / 14 (Depends on shield or adapter used)</a:t>
-            </a:r>
-          </a:p>
-          <a:p>
-            <a:pPr marL="285750" indent="-285750" algn="just">
-              <a:buFont typeface="Arial" panose="020B0604020202020204" pitchFamily="34" charset="0"/>
-              <a:buChar char="•"/>
-            </a:pPr>
-            <a:r>
-              <a:rPr lang="en-US" dirty="0"/>
-              <a:t>Connect SCK to pin 13</a:t>
-            </a:r>
-          </a:p>
-          <a:p>
-            <a:pPr marL="285750" indent="-285750" algn="just">
-              <a:buFont typeface="Arial" panose="020B0604020202020204" pitchFamily="34" charset="0"/>
-              <a:buChar char="•"/>
-            </a:pPr>
-            <a:r>
-              <a:rPr lang="en-US" dirty="0"/>
-              <a:t>MOSI connect to the pin 11</a:t>
-            </a:r>
-          </a:p>
-          <a:p>
-            <a:pPr marL="285750" indent="-285750" algn="just">
-              <a:buFont typeface="Arial" panose="020B0604020202020204" pitchFamily="34" charset="0"/>
-              <a:buChar char="•"/>
-            </a:pPr>
-            <a:r>
-              <a:rPr lang="en-US"/>
-              <a:t>Connect </a:t>
-            </a:r>
-            <a:r>
-              <a:rPr lang="en-US" dirty="0"/>
-              <a:t>MISO to pin 12</a:t>
-            </a:r>
-          </a:p>
-          <a:p>
-            <a:pPr algn="just"/>
-            <a:endParaRPr lang="en-US" dirty="0"/>
-          </a:p>
-          <a:p>
-            <a:pPr algn="just"/>
-            <a:r>
-              <a:rPr lang="en-US" dirty="0"/>
-              <a:t>After completing the connection, connect the Arduino to power supply with USB cable.</a:t>
-            </a:r>
-          </a:p>
-        </p:txBody>
-      </p:sp>
-      <p:pic>
-        <p:nvPicPr>
-          <p:cNvPr id="6" name="Picture 2" descr="https://cdn.instructables.com/FP6/JK1J/J282ZBBC/FP6JK1JJ282ZBBC.LARGE.jpg?auto=webp&amp;fit=bounds">
-            <a:extLst>
-              <a:ext uri="{FF2B5EF4-FFF2-40B4-BE49-F238E27FC236}">
-                <a16:creationId xmlns:a16="http://schemas.microsoft.com/office/drawing/2014/main" id="{B5FD7009-1413-4B9D-AFDA-689997752208}"/>
+                <a16:creationId xmlns:a16="http://schemas.microsoft.com/office/drawing/2014/main" id="{0785EA2E-B76D-481B-9F8F-17521903C96A}"/>
               </a:ext>
             </a:extLst>
           </p:cNvPr>
@@ -6400,8 +6570,8 @@
         </p:blipFill>
         <p:spPr bwMode="auto">
           <a:xfrm>
-            <a:off x="0" y="1410887"/>
-            <a:ext cx="7296150" cy="3257550"/>
+            <a:off x="9969500" y="4783079"/>
+            <a:ext cx="1965325" cy="1965325"/>
           </a:xfrm>
           <a:prstGeom prst="rect">
             <a:avLst/>
@@ -6420,10 +6590,38 @@
       </p:pic>
       <p:sp>
         <p:nvSpPr>
-          <p:cNvPr id="7" name="Rectangle 6">
+          <p:cNvPr id="2" name="Title 1">
             <a:extLst>
               <a:ext uri="{FF2B5EF4-FFF2-40B4-BE49-F238E27FC236}">
-                <a16:creationId xmlns:a16="http://schemas.microsoft.com/office/drawing/2014/main" id="{667FCA7C-5A59-4702-9FD7-8F5AA1B5B25B}"/>
+                <a16:creationId xmlns:a16="http://schemas.microsoft.com/office/drawing/2014/main" id="{F1776AEA-DA03-417F-8258-814B2F06E6BB}"/>
+              </a:ext>
+            </a:extLst>
+          </p:cNvPr>
+          <p:cNvSpPr>
+            <a:spLocks noGrp="1"/>
+          </p:cNvSpPr>
+          <p:nvPr>
+            <p:ph type="title"/>
+          </p:nvPr>
+        </p:nvSpPr>
+        <p:spPr/>
+        <p:txBody>
+          <a:bodyPr/>
+          <a:lstStyle/>
+          <a:p>
+            <a:r>
+              <a:rPr lang="en-US" dirty="0"/>
+              <a:t>Circuit</a:t>
+            </a:r>
+          </a:p>
+        </p:txBody>
+      </p:sp>
+      <p:sp>
+        <p:nvSpPr>
+          <p:cNvPr id="4" name="Rectangle 3">
+            <a:extLst>
+              <a:ext uri="{FF2B5EF4-FFF2-40B4-BE49-F238E27FC236}">
+                <a16:creationId xmlns:a16="http://schemas.microsoft.com/office/drawing/2014/main" id="{0A68AC33-568D-4580-8773-9C970024AB18}"/>
               </a:ext>
             </a:extLst>
           </p:cNvPr>
@@ -6432,43 +6630,26 @@
         </p:nvSpPr>
         <p:spPr>
           <a:xfrm>
-            <a:off x="257175" y="4407573"/>
-            <a:ext cx="6096000" cy="2308324"/>
+            <a:off x="7406936" y="1864674"/>
+            <a:ext cx="4613429" cy="2800767"/>
           </a:xfrm>
           <a:prstGeom prst="rect">
             <a:avLst/>
           </a:prstGeom>
         </p:spPr>
         <p:txBody>
-          <a:bodyPr>
+          <a:bodyPr wrap="square">
             <a:spAutoFit/>
           </a:bodyPr>
           <a:lstStyle/>
-          <a:p>
-            <a:pPr algn="just"/>
-            <a:r>
-              <a:rPr lang="en-US" sz="1600" dirty="0">
-                <a:solidFill>
-                  <a:srgbClr val="555555"/>
-                </a:solidFill>
-                <a:latin typeface="Nunito"/>
-              </a:rPr>
-              <a:t>This module uses the standard SPI interface for communication, which involve SPI buses, MISO, MOSI, SCK, and a CS signal pin. through programming, the data can easily be read and wrote into SD Card by using the Arduino or other microcontrollers.</a:t>
-            </a:r>
-          </a:p>
           <a:p>
             <a:pPr marL="285750" indent="-285750" algn="just">
               <a:buFont typeface="Arial" panose="020B0604020202020204" pitchFamily="34" charset="0"/>
               <a:buChar char="•"/>
             </a:pPr>
             <a:r>
-              <a:rPr lang="en-US" sz="1600" dirty="0">
-                <a:solidFill>
-                  <a:srgbClr val="555555"/>
-                </a:solidFill>
-                <a:latin typeface="Nunito"/>
-              </a:rPr>
-              <a:t>CS (chip select)</a:t>
+              <a:rPr lang="en-US" sz="1600" dirty="0"/>
+              <a:t>Connect VCC with 5V in the Arduino.</a:t>
             </a:r>
           </a:p>
           <a:p>
@@ -6477,13 +6658,8 @@
               <a:buChar char="•"/>
             </a:pPr>
             <a:r>
-              <a:rPr lang="en-US" sz="1600" dirty="0">
-                <a:solidFill>
-                  <a:srgbClr val="555555"/>
-                </a:solidFill>
-                <a:latin typeface="Nunito"/>
-              </a:rPr>
-              <a:t>SCK (serial clock)</a:t>
+              <a:rPr lang="en-US" sz="1600" dirty="0"/>
+              <a:t>Connect the GND of SD card to the ground of Arduino.</a:t>
             </a:r>
           </a:p>
           <a:p>
@@ -6492,13 +6668,8 @@
               <a:buChar char="•"/>
             </a:pPr>
             <a:r>
-              <a:rPr lang="en-US" sz="1600" dirty="0">
-                <a:solidFill>
-                  <a:srgbClr val="555555"/>
-                </a:solidFill>
-                <a:latin typeface="Nunito"/>
-              </a:rPr>
-              <a:t>MOSI (master out slave in)</a:t>
+              <a:rPr lang="en-US" sz="1600" dirty="0"/>
+              <a:t>Connect CS to pin 10 / 4 / 14 (Depends on shield or adapter used)</a:t>
             </a:r>
           </a:p>
           <a:p>
@@ -6507,13 +6678,8 @@
               <a:buChar char="•"/>
             </a:pPr>
             <a:r>
-              <a:rPr lang="en-US" sz="1600" dirty="0">
-                <a:solidFill>
-                  <a:srgbClr val="555555"/>
-                </a:solidFill>
-                <a:latin typeface="Nunito"/>
-              </a:rPr>
-              <a:t>VCC (3.3V or 5V)</a:t>
+              <a:rPr lang="en-US" sz="1600" dirty="0"/>
+              <a:t>Connect SCK to pin 13</a:t>
             </a:r>
           </a:p>
           <a:p>
@@ -6522,30 +6688,39 @@
               <a:buChar char="•"/>
             </a:pPr>
             <a:r>
-              <a:rPr lang="en-US" sz="1600" dirty="0">
-                <a:solidFill>
-                  <a:srgbClr val="555555"/>
-                </a:solidFill>
-                <a:latin typeface="Nunito"/>
-              </a:rPr>
-              <a:t>GND (ground)</a:t>
-            </a:r>
-            <a:endParaRPr lang="en-US" sz="1600" b="0" i="0" dirty="0">
-              <a:solidFill>
-                <a:srgbClr val="555555"/>
-              </a:solidFill>
-              <a:effectLst/>
-              <a:latin typeface="Nunito"/>
-            </a:endParaRPr>
+              <a:rPr lang="en-US" sz="1600" dirty="0"/>
+              <a:t>MOSI connect to the pin 11</a:t>
+            </a:r>
+          </a:p>
+          <a:p>
+            <a:pPr marL="285750" indent="-285750" algn="just">
+              <a:buFont typeface="Arial" panose="020B0604020202020204" pitchFamily="34" charset="0"/>
+              <a:buChar char="•"/>
+            </a:pPr>
+            <a:r>
+              <a:rPr lang="en-US" sz="1600" dirty="0"/>
+              <a:t>Connect MISO to pin 12</a:t>
+            </a:r>
+          </a:p>
+          <a:p>
+            <a:pPr algn="just"/>
+            <a:endParaRPr lang="en-US" sz="1600" dirty="0"/>
+          </a:p>
+          <a:p>
+            <a:pPr algn="just"/>
+            <a:r>
+              <a:rPr lang="en-US" sz="1600" dirty="0"/>
+              <a:t>After completing the connection, connect the Arduino to power supply with USB cable.</a:t>
+            </a:r>
           </a:p>
         </p:txBody>
       </p:sp>
       <p:pic>
         <p:nvPicPr>
-          <p:cNvPr id="8" name="Picture 2" descr="https://robu.in/wp-content/uploads/2016/03/New-Data-Logger-Module-Logging-Recorder-Shield-V1-0-for-Arduino-UNO-SD-Card.jpg_640x640.jpg">
+          <p:cNvPr id="6" name="Picture 2" descr="https://cdn.instructables.com/FP6/JK1J/J282ZBBC/FP6JK1JJ282ZBBC.LARGE.jpg?auto=webp&amp;fit=bounds">
             <a:extLst>
               <a:ext uri="{FF2B5EF4-FFF2-40B4-BE49-F238E27FC236}">
-                <a16:creationId xmlns:a16="http://schemas.microsoft.com/office/drawing/2014/main" id="{0785EA2E-B76D-481B-9F8F-17521903C96A}"/>
+                <a16:creationId xmlns:a16="http://schemas.microsoft.com/office/drawing/2014/main" id="{B5FD7009-1413-4B9D-AFDA-689997752208}"/>
               </a:ext>
             </a:extLst>
           </p:cNvPr>
@@ -6569,8 +6744,8 @@
         </p:blipFill>
         <p:spPr bwMode="auto">
           <a:xfrm>
-            <a:off x="9829799" y="4800600"/>
-            <a:ext cx="1965325" cy="1965325"/>
+            <a:off x="0" y="1410887"/>
+            <a:ext cx="7296150" cy="3257550"/>
           </a:xfrm>
           <a:prstGeom prst="rect">
             <a:avLst/>
@@ -6589,6 +6764,128 @@
       </p:pic>
       <p:sp>
         <p:nvSpPr>
+          <p:cNvPr id="7" name="Rectangle 6">
+            <a:extLst>
+              <a:ext uri="{FF2B5EF4-FFF2-40B4-BE49-F238E27FC236}">
+                <a16:creationId xmlns:a16="http://schemas.microsoft.com/office/drawing/2014/main" id="{667FCA7C-5A59-4702-9FD7-8F5AA1B5B25B}"/>
+              </a:ext>
+            </a:extLst>
+          </p:cNvPr>
+          <p:cNvSpPr/>
+          <p:nvPr/>
+        </p:nvSpPr>
+        <p:spPr>
+          <a:xfrm>
+            <a:off x="257175" y="4407573"/>
+            <a:ext cx="6096000" cy="2308324"/>
+          </a:xfrm>
+          <a:prstGeom prst="rect">
+            <a:avLst/>
+          </a:prstGeom>
+        </p:spPr>
+        <p:txBody>
+          <a:bodyPr>
+            <a:spAutoFit/>
+          </a:bodyPr>
+          <a:lstStyle/>
+          <a:p>
+            <a:pPr algn="just"/>
+            <a:r>
+              <a:rPr lang="en-US" sz="1600" dirty="0">
+                <a:solidFill>
+                  <a:srgbClr val="555555"/>
+                </a:solidFill>
+                <a:latin typeface="Nunito"/>
+              </a:rPr>
+              <a:t>This module uses the standard SPI interface for communication, which involve SPI buses, MISO, MOSI, SCK, and a CS signal pin. through programming, the data can easily be read and wrote into SD Card by using the Arduino or other microcontrollers.</a:t>
+            </a:r>
+          </a:p>
+          <a:p>
+            <a:pPr marL="285750" indent="-285750" algn="just">
+              <a:buFont typeface="Arial" panose="020B0604020202020204" pitchFamily="34" charset="0"/>
+              <a:buChar char="•"/>
+            </a:pPr>
+            <a:r>
+              <a:rPr lang="en-US" sz="1600" dirty="0">
+                <a:solidFill>
+                  <a:srgbClr val="555555"/>
+                </a:solidFill>
+                <a:latin typeface="Nunito"/>
+              </a:rPr>
+              <a:t>CS (chip select)</a:t>
+            </a:r>
+          </a:p>
+          <a:p>
+            <a:pPr marL="285750" indent="-285750" algn="just">
+              <a:buFont typeface="Arial" panose="020B0604020202020204" pitchFamily="34" charset="0"/>
+              <a:buChar char="•"/>
+            </a:pPr>
+            <a:r>
+              <a:rPr lang="en-US" sz="1600" dirty="0">
+                <a:solidFill>
+                  <a:srgbClr val="555555"/>
+                </a:solidFill>
+                <a:latin typeface="Nunito"/>
+              </a:rPr>
+              <a:t>SCK (serial clock)</a:t>
+            </a:r>
+          </a:p>
+          <a:p>
+            <a:pPr marL="285750" indent="-285750" algn="just">
+              <a:buFont typeface="Arial" panose="020B0604020202020204" pitchFamily="34" charset="0"/>
+              <a:buChar char="•"/>
+            </a:pPr>
+            <a:r>
+              <a:rPr lang="en-US" sz="1600" dirty="0">
+                <a:solidFill>
+                  <a:srgbClr val="555555"/>
+                </a:solidFill>
+                <a:latin typeface="Nunito"/>
+              </a:rPr>
+              <a:t>MOSI (master out slave in)</a:t>
+            </a:r>
+          </a:p>
+          <a:p>
+            <a:pPr marL="285750" indent="-285750" algn="just">
+              <a:buFont typeface="Arial" panose="020B0604020202020204" pitchFamily="34" charset="0"/>
+              <a:buChar char="•"/>
+            </a:pPr>
+            <a:r>
+              <a:rPr lang="en-US" sz="1600" dirty="0">
+                <a:solidFill>
+                  <a:srgbClr val="555555"/>
+                </a:solidFill>
+                <a:latin typeface="Nunito"/>
+              </a:rPr>
+              <a:t>VCC (3.3V or 5V)</a:t>
+            </a:r>
+          </a:p>
+          <a:p>
+            <a:pPr marL="285750" indent="-285750" algn="just">
+              <a:buFont typeface="Arial" panose="020B0604020202020204" pitchFamily="34" charset="0"/>
+              <a:buChar char="•"/>
+            </a:pPr>
+            <a:r>
+              <a:rPr lang="en-US" sz="1600" dirty="0">
+                <a:solidFill>
+                  <a:srgbClr val="555555"/>
+                </a:solidFill>
+                <a:latin typeface="Nunito"/>
+              </a:rPr>
+              <a:t>GND (ground)</a:t>
+            </a:r>
+            <a:endParaRPr lang="en-US" sz="1600" b="0" i="0" dirty="0">
+              <a:solidFill>
+                <a:srgbClr val="555555"/>
+              </a:solidFill>
+              <a:effectLst/>
+              <a:latin typeface="Nunito"/>
+            </a:endParaRPr>
+          </a:p>
+        </p:txBody>
+      </p:sp>
+      <p:sp>
+        <p:nvSpPr>
           <p:cNvPr id="3" name="Rectangle 2">
             <a:extLst>
               <a:ext uri="{FF2B5EF4-FFF2-40B4-BE49-F238E27FC236}">
@@ -6615,13 +6912,21 @@
           <a:lstStyle/>
           <a:p>
             <a:r>
-              <a:rPr lang="en-US" dirty="0"/>
+              <a:rPr lang="en-US" dirty="0">
+                <a:highlight>
+                  <a:srgbClr val="FFFF00"/>
+                </a:highlight>
+              </a:rPr>
               <a:t>MMC + RTC  </a:t>
             </a:r>
           </a:p>
           <a:p>
             <a:r>
-              <a:rPr lang="en-US" dirty="0"/>
+              <a:rPr lang="en-US" dirty="0">
+                <a:highlight>
+                  <a:srgbClr val="FFFF00"/>
+                </a:highlight>
+              </a:rPr>
               <a:t>Shield</a:t>
             </a:r>
           </a:p>
@@ -6655,7 +6960,11 @@
           <a:lstStyle/>
           <a:p>
             <a:r>
-              <a:rPr lang="en-US" dirty="0"/>
+              <a:rPr lang="en-US" dirty="0">
+                <a:highlight>
+                  <a:srgbClr val="FFFF00"/>
+                </a:highlight>
+              </a:rPr>
               <a:t>MMC Adapter</a:t>
             </a:r>
           </a:p>
@@ -7081,7 +7390,7 @@
           <p:cNvPr id="2" name="Title 1">
             <a:extLst>
               <a:ext uri="{FF2B5EF4-FFF2-40B4-BE49-F238E27FC236}">
-                <a16:creationId xmlns:a16="http://schemas.microsoft.com/office/drawing/2014/main" id="{96B42ADA-6770-402C-9F0B-A3C5159885CA}"/>
+                <a16:creationId xmlns:a16="http://schemas.microsoft.com/office/drawing/2014/main" id="{A459E8BF-0FF2-4C76-8952-3960E75A89F1}"/>
               </a:ext>
             </a:extLst>
           </p:cNvPr>
@@ -7099,15 +7408,93 @@
           <a:p>
             <a:r>
               <a:rPr lang="en-US" dirty="0"/>
-              <a:t>Sketch file</a:t>
-            </a:r>
-          </a:p>
-        </p:txBody>
-      </p:sp>
+              <a:t>TROUBLESHOOTING</a:t>
+            </a:r>
+          </a:p>
+        </p:txBody>
+      </p:sp>
+      <p:sp>
+        <p:nvSpPr>
+          <p:cNvPr id="4" name="Rectangle 3">
+            <a:extLst>
+              <a:ext uri="{FF2B5EF4-FFF2-40B4-BE49-F238E27FC236}">
+                <a16:creationId xmlns:a16="http://schemas.microsoft.com/office/drawing/2014/main" id="{041C06E0-01EA-4438-A97E-1693BB7AD57F}"/>
+              </a:ext>
+            </a:extLst>
+          </p:cNvPr>
+          <p:cNvSpPr/>
+          <p:nvPr/>
+        </p:nvSpPr>
+        <p:spPr>
+          <a:xfrm>
+            <a:off x="652645" y="2205647"/>
+            <a:ext cx="8997381" cy="369332"/>
+          </a:xfrm>
+          <a:prstGeom prst="rect">
+            <a:avLst/>
+          </a:prstGeom>
+        </p:spPr>
+        <p:txBody>
+          <a:bodyPr wrap="square">
+            <a:spAutoFit/>
+          </a:bodyPr>
+          <a:lstStyle/>
+          <a:p>
+            <a:r>
+              <a:rPr lang="en-US" dirty="0">
+                <a:solidFill>
+                  <a:srgbClr val="555555"/>
+                </a:solidFill>
+                <a:latin typeface="Nunito"/>
+              </a:rPr>
+              <a:t>Tried everything, tested everything (wiring, CS pin, 5V power input) …still getting this error ?</a:t>
+            </a:r>
+            <a:endParaRPr lang="en-US" dirty="0"/>
+          </a:p>
+        </p:txBody>
+      </p:sp>
+      <p:pic>
+        <p:nvPicPr>
+          <p:cNvPr id="5" name="Picture 4">
+            <a:extLst>
+              <a:ext uri="{FF2B5EF4-FFF2-40B4-BE49-F238E27FC236}">
+                <a16:creationId xmlns:a16="http://schemas.microsoft.com/office/drawing/2014/main" id="{CC8EA177-C354-4D26-8254-6BC9061C7669}"/>
+              </a:ext>
+            </a:extLst>
+          </p:cNvPr>
+          <p:cNvPicPr>
+            <a:picLocks noChangeAspect="1"/>
+          </p:cNvPicPr>
+          <p:nvPr/>
+        </p:nvPicPr>
+        <p:blipFill>
+          <a:blip r:embed="rId2"/>
+          <a:stretch>
+            <a:fillRect/>
+          </a:stretch>
+        </p:blipFill>
+        <p:spPr>
+          <a:xfrm>
+            <a:off x="652645" y="2648597"/>
+            <a:ext cx="8791575" cy="1952625"/>
+          </a:xfrm>
+          <a:prstGeom prst="rect">
+            <a:avLst/>
+          </a:prstGeom>
+          <a:effectLst>
+            <a:glow rad="63500">
+              <a:schemeClr val="accent2">
+                <a:satMod val="175000"/>
+                <a:alpha val="40000"/>
+              </a:schemeClr>
+            </a:glow>
+          </a:effectLst>
+        </p:spPr>
+      </p:pic>
     </p:spTree>
     <p:extLst>
       <p:ext uri="{BB962C8B-B14F-4D97-AF65-F5344CB8AC3E}">
-        <p14:creationId xmlns:p14="http://schemas.microsoft.com/office/powerpoint/2010/main" val="2500575355"/>
+        <p14:creationId xmlns:p14="http://schemas.microsoft.com/office/powerpoint/2010/main" val="2670325279"/>
       </p:ext>
     </p:extLst>
   </p:cSld>
@@ -7157,257 +7544,15 @@
           <a:p>
             <a:r>
               <a:rPr lang="en-US" dirty="0"/>
-              <a:t>Where to buy</a:t>
-            </a:r>
-          </a:p>
-        </p:txBody>
-      </p:sp>
-      <p:pic>
-        <p:nvPicPr>
-          <p:cNvPr id="2050" name="Picture 2" descr="https://robu.in/wp-content/uploads/2016/03/New-Data-Logger-Module-Logging-Recorder-Shield-V1-0-for-Arduino-UNO-SD-Card.jpg_640x640.jpg">
-            <a:extLst>
-              <a:ext uri="{FF2B5EF4-FFF2-40B4-BE49-F238E27FC236}">
-                <a16:creationId xmlns:a16="http://schemas.microsoft.com/office/drawing/2014/main" id="{F4259B91-3AF6-4384-B9FA-8DCA02EEC9E8}"/>
-              </a:ext>
-            </a:extLst>
-          </p:cNvPr>
-          <p:cNvPicPr>
-            <a:picLocks noChangeAspect="1" noChangeArrowheads="1"/>
-          </p:cNvPicPr>
-          <p:nvPr/>
-        </p:nvPicPr>
-        <p:blipFill>
-          <a:blip r:embed="rId2">
-            <a:extLst>
-              <a:ext uri="{28A0092B-C50C-407E-A947-70E740481C1C}">
-                <a14:useLocalDpi xmlns:a14="http://schemas.microsoft.com/office/drawing/2010/main" val="0"/>
-              </a:ext>
-            </a:extLst>
-          </a:blip>
-          <a:srcRect/>
-          <a:stretch>
-            <a:fillRect/>
-          </a:stretch>
-        </p:blipFill>
-        <p:spPr bwMode="auto">
-          <a:xfrm>
-            <a:off x="419100" y="1410887"/>
-            <a:ext cx="4125292" cy="4125292"/>
-          </a:xfrm>
-          <a:prstGeom prst="rect">
-            <a:avLst/>
-          </a:prstGeom>
-          <a:noFill/>
-          <a:extLst>
-            <a:ext uri="{909E8E84-426E-40DD-AFC4-6F175D3DCCD1}">
-              <a14:hiddenFill xmlns:a14="http://schemas.microsoft.com/office/drawing/2010/main">
-                <a:solidFill>
-                  <a:srgbClr val="FFFFFF"/>
-                </a:solidFill>
-              </a14:hiddenFill>
-            </a:ext>
-          </a:extLst>
-        </p:spPr>
-      </p:pic>
-      <p:sp>
-        <p:nvSpPr>
-          <p:cNvPr id="4" name="Rectangle 3">
-            <a:extLst>
-              <a:ext uri="{FF2B5EF4-FFF2-40B4-BE49-F238E27FC236}">
-                <a16:creationId xmlns:a16="http://schemas.microsoft.com/office/drawing/2014/main" id="{10889E3F-9CD8-43B1-AC78-DEAF61F1FB80}"/>
-              </a:ext>
-            </a:extLst>
-          </p:cNvPr>
-          <p:cNvSpPr/>
-          <p:nvPr/>
-        </p:nvSpPr>
-        <p:spPr>
-          <a:xfrm>
-            <a:off x="419100" y="5859527"/>
-            <a:ext cx="6096000" cy="646331"/>
-          </a:xfrm>
-          <a:prstGeom prst="rect">
-            <a:avLst/>
-          </a:prstGeom>
-        </p:spPr>
-        <p:txBody>
-          <a:bodyPr>
-            <a:spAutoFit/>
-          </a:bodyPr>
-          <a:lstStyle/>
-          <a:p>
-            <a:r>
-              <a:rPr lang="en-US" dirty="0">
-                <a:hlinkClick r:id="rId3"/>
-              </a:rPr>
-              <a:t>https://robu.in/product/data-logger-module-logging-shield-data-recorder-shield/</a:t>
-            </a:r>
-            <a:endParaRPr lang="en-US" dirty="0"/>
-          </a:p>
-        </p:txBody>
-      </p:sp>
-      <p:pic>
-        <p:nvPicPr>
-          <p:cNvPr id="2052" name="Picture 4" descr="https://robu.in/wp-content/uploads/2016/03/Micro-SD-Card-Reader-Module-2.jpg">
-            <a:extLst>
-              <a:ext uri="{FF2B5EF4-FFF2-40B4-BE49-F238E27FC236}">
-                <a16:creationId xmlns:a16="http://schemas.microsoft.com/office/drawing/2014/main" id="{C82D4C66-C4C4-4A05-844A-229D5DCA1F49}"/>
-              </a:ext>
-            </a:extLst>
-          </p:cNvPr>
-          <p:cNvPicPr>
-            <a:picLocks noChangeAspect="1" noChangeArrowheads="1"/>
-          </p:cNvPicPr>
-          <p:nvPr/>
-        </p:nvPicPr>
-        <p:blipFill>
-          <a:blip r:embed="rId4">
-            <a:extLst>
-              <a:ext uri="{28A0092B-C50C-407E-A947-70E740481C1C}">
-                <a14:useLocalDpi xmlns:a14="http://schemas.microsoft.com/office/drawing/2010/main" val="0"/>
-              </a:ext>
-            </a:extLst>
-          </a:blip>
-          <a:srcRect/>
-          <a:stretch>
-            <a:fillRect/>
-          </a:stretch>
-        </p:blipFill>
-        <p:spPr bwMode="auto">
-          <a:xfrm>
-            <a:off x="7236627" y="2057401"/>
-            <a:ext cx="4269573" cy="4269573"/>
-          </a:xfrm>
-          <a:prstGeom prst="rect">
-            <a:avLst/>
-          </a:prstGeom>
-          <a:noFill/>
-          <a:extLst>
-            <a:ext uri="{909E8E84-426E-40DD-AFC4-6F175D3DCCD1}">
-              <a14:hiddenFill xmlns:a14="http://schemas.microsoft.com/office/drawing/2010/main">
-                <a:solidFill>
-                  <a:srgbClr val="FFFFFF"/>
-                </a:solidFill>
-              </a14:hiddenFill>
-            </a:ext>
-          </a:extLst>
-        </p:spPr>
-      </p:pic>
-      <p:sp>
-        <p:nvSpPr>
-          <p:cNvPr id="5" name="Rectangle 4">
-            <a:extLst>
-              <a:ext uri="{FF2B5EF4-FFF2-40B4-BE49-F238E27FC236}">
-                <a16:creationId xmlns:a16="http://schemas.microsoft.com/office/drawing/2014/main" id="{81ED98FB-83CD-4F66-9690-1F4F59CDAE71}"/>
-              </a:ext>
-            </a:extLst>
-          </p:cNvPr>
-          <p:cNvSpPr/>
-          <p:nvPr/>
-        </p:nvSpPr>
-        <p:spPr>
-          <a:xfrm>
-            <a:off x="6515100" y="2149190"/>
-            <a:ext cx="3264420" cy="369332"/>
-          </a:xfrm>
-          <a:prstGeom prst="rect">
-            <a:avLst/>
-          </a:prstGeom>
-        </p:spPr>
-        <p:txBody>
-          <a:bodyPr wrap="none">
-            <a:spAutoFit/>
-          </a:bodyPr>
-          <a:lstStyle/>
-          <a:p>
-            <a:r>
-              <a:rPr lang="en-US" dirty="0">
-                <a:latin typeface="Lucida Grande"/>
-              </a:rPr>
-              <a:t>Micro SD Card Reader Module</a:t>
-            </a:r>
-            <a:endParaRPr lang="en-US" dirty="0"/>
-          </a:p>
-        </p:txBody>
-      </p:sp>
-      <p:sp>
-        <p:nvSpPr>
-          <p:cNvPr id="6" name="Rectangle 5">
-            <a:extLst>
-              <a:ext uri="{FF2B5EF4-FFF2-40B4-BE49-F238E27FC236}">
-                <a16:creationId xmlns:a16="http://schemas.microsoft.com/office/drawing/2014/main" id="{7C6DC232-4B90-47B6-B112-18ED7C8789CB}"/>
-              </a:ext>
-            </a:extLst>
-          </p:cNvPr>
-          <p:cNvSpPr/>
-          <p:nvPr/>
-        </p:nvSpPr>
-        <p:spPr>
-          <a:xfrm>
-            <a:off x="6515100" y="2518522"/>
-            <a:ext cx="5480988" cy="369332"/>
-          </a:xfrm>
-          <a:prstGeom prst="rect">
-            <a:avLst/>
-          </a:prstGeom>
-        </p:spPr>
-        <p:txBody>
-          <a:bodyPr wrap="none">
-            <a:spAutoFit/>
-          </a:bodyPr>
-          <a:lstStyle/>
-          <a:p>
-            <a:r>
-              <a:rPr lang="en-US" dirty="0">
-                <a:hlinkClick r:id="rId5"/>
-              </a:rPr>
-              <a:t>https://robu.in/product/micro-sd-card-module/</a:t>
-            </a:r>
-            <a:endParaRPr lang="en-US" dirty="0"/>
-          </a:p>
-        </p:txBody>
-      </p:sp>
-      <p:sp>
-        <p:nvSpPr>
-          <p:cNvPr id="3" name="Rectangle 2">
-            <a:extLst>
-              <a:ext uri="{FF2B5EF4-FFF2-40B4-BE49-F238E27FC236}">
-                <a16:creationId xmlns:a16="http://schemas.microsoft.com/office/drawing/2014/main" id="{FA031CB6-1866-4648-8FB6-D73770449679}"/>
-              </a:ext>
-            </a:extLst>
-          </p:cNvPr>
-          <p:cNvSpPr/>
-          <p:nvPr/>
-        </p:nvSpPr>
-        <p:spPr>
-          <a:xfrm>
-            <a:off x="419100" y="5472844"/>
-            <a:ext cx="7073900" cy="369332"/>
-          </a:xfrm>
-          <a:prstGeom prst="rect">
-            <a:avLst/>
-          </a:prstGeom>
-        </p:spPr>
-        <p:txBody>
-          <a:bodyPr wrap="square">
-            <a:spAutoFit/>
-          </a:bodyPr>
-          <a:lstStyle/>
-          <a:p>
-            <a:r>
-              <a:rPr lang="en-US" dirty="0">
-                <a:latin typeface="Lucida Grande"/>
-              </a:rPr>
-              <a:t>Data Logger module Logging Shield data Recorder Shield (with RTC)</a:t>
-            </a:r>
-            <a:endParaRPr lang="en-US" dirty="0"/>
+              <a:t>Sketch file</a:t>
+            </a:r>
           </a:p>
         </p:txBody>
       </p:sp>
     </p:spTree>
     <p:extLst>
       <p:ext uri="{BB962C8B-B14F-4D97-AF65-F5344CB8AC3E}">
-        <p14:creationId xmlns:p14="http://schemas.microsoft.com/office/powerpoint/2010/main" val="2457038222"/>
+        <p14:creationId xmlns:p14="http://schemas.microsoft.com/office/powerpoint/2010/main" val="2500575355"/>
       </p:ext>
     </p:extLst>
   </p:cSld>

</xml_diff>

<commit_message>
Custom Projects: Added IR controller project
</commit_message>
<xml_diff>
--- a/custom_projects/01_MicroSdCardInterfacing/01_MicroSdCardInterfacing.pptx
+++ b/custom_projects/01_MicroSdCardInterfacing/01_MicroSdCardInterfacing.pptx
@@ -15,6 +15,7 @@
     <p:sldId id="267" r:id="rId9"/>
     <p:sldId id="263" r:id="rId10"/>
     <p:sldId id="265" r:id="rId11"/>
+    <p:sldId id="268" r:id="rId12"/>
   </p:sldIdLst>
   <p:sldSz cx="12192000" cy="6858000"/>
   <p:notesSz cx="6858000" cy="9144000"/>
@@ -291,7 +292,7 @@
           <a:p>
             <a:fld id="{48A87A34-81AB-432B-8DAE-1953F412C126}" type="datetimeFigureOut">
               <a:rPr lang="en-US" dirty="0"/>
-              <a:t>10/19/2019</a:t>
+              <a:t>11/5/2019</a:t>
             </a:fld>
             <a:endParaRPr lang="en-US" dirty="0"/>
           </a:p>
@@ -553,7 +554,7 @@
           <a:p>
             <a:fld id="{48A87A34-81AB-432B-8DAE-1953F412C126}" type="datetimeFigureOut">
               <a:rPr lang="en-US" dirty="0"/>
-              <a:t>10/19/2019</a:t>
+              <a:t>11/5/2019</a:t>
             </a:fld>
             <a:endParaRPr lang="en-US" dirty="0"/>
           </a:p>
@@ -780,7 +781,7 @@
             <a:fld id="{48A87A34-81AB-432B-8DAE-1953F412C126}" type="datetimeFigureOut">
               <a:rPr lang="en-US" dirty="0"/>
               <a:pPr/>
-              <a:t>10/19/2019</a:t>
+              <a:t>11/5/2019</a:t>
             </a:fld>
             <a:endParaRPr lang="en-US" dirty="0"/>
           </a:p>
@@ -1086,7 +1087,7 @@
             <a:fld id="{48A87A34-81AB-432B-8DAE-1953F412C126}" type="datetimeFigureOut">
               <a:rPr lang="en-US" dirty="0"/>
               <a:pPr/>
-              <a:t>10/19/2019</a:t>
+              <a:t>11/5/2019</a:t>
             </a:fld>
             <a:endParaRPr lang="en-US" dirty="0"/>
           </a:p>
@@ -1555,7 +1556,7 @@
             <a:fld id="{48A87A34-81AB-432B-8DAE-1953F412C126}" type="datetimeFigureOut">
               <a:rPr lang="en-US" dirty="0"/>
               <a:pPr/>
-              <a:t>10/19/2019</a:t>
+              <a:t>11/5/2019</a:t>
             </a:fld>
             <a:endParaRPr lang="en-US" dirty="0"/>
           </a:p>
@@ -2097,7 +2098,7 @@
           <a:p>
             <a:fld id="{48A87A34-81AB-432B-8DAE-1953F412C126}" type="datetimeFigureOut">
               <a:rPr lang="en-US" dirty="0"/>
-              <a:t>10/19/2019</a:t>
+              <a:t>11/5/2019</a:t>
             </a:fld>
             <a:endParaRPr lang="en-US" dirty="0"/>
           </a:p>
@@ -2866,7 +2867,7 @@
           <a:p>
             <a:fld id="{48A87A34-81AB-432B-8DAE-1953F412C126}" type="datetimeFigureOut">
               <a:rPr lang="en-US" dirty="0"/>
-              <a:t>10/19/2019</a:t>
+              <a:t>11/5/2019</a:t>
             </a:fld>
             <a:endParaRPr lang="en-US" dirty="0"/>
           </a:p>
@@ -3036,7 +3037,7 @@
           <a:p>
             <a:fld id="{48A87A34-81AB-432B-8DAE-1953F412C126}" type="datetimeFigureOut">
               <a:rPr lang="en-US" dirty="0"/>
-              <a:t>10/19/2019</a:t>
+              <a:t>11/5/2019</a:t>
             </a:fld>
             <a:endParaRPr lang="en-US" dirty="0"/>
           </a:p>
@@ -3255,7 +3256,7 @@
             <a:fld id="{48A87A34-81AB-432B-8DAE-1953F412C126}" type="datetimeFigureOut">
               <a:rPr lang="en-US" dirty="0"/>
               <a:pPr/>
-              <a:t>10/19/2019</a:t>
+              <a:t>11/5/2019</a:t>
             </a:fld>
             <a:endParaRPr lang="en-US" dirty="0"/>
           </a:p>
@@ -3430,7 +3431,7 @@
           <a:p>
             <a:fld id="{48A87A34-81AB-432B-8DAE-1953F412C126}" type="datetimeFigureOut">
               <a:rPr lang="en-US" dirty="0"/>
-              <a:t>10/19/2019</a:t>
+              <a:t>11/5/2019</a:t>
             </a:fld>
             <a:endParaRPr lang="en-US" dirty="0"/>
           </a:p>
@@ -3715,7 +3716,7 @@
             <a:fld id="{48A87A34-81AB-432B-8DAE-1953F412C126}" type="datetimeFigureOut">
               <a:rPr lang="en-US" dirty="0"/>
               <a:pPr/>
-              <a:t>10/19/2019</a:t>
+              <a:t>11/5/2019</a:t>
             </a:fld>
             <a:endParaRPr lang="en-US" dirty="0"/>
           </a:p>
@@ -3952,7 +3953,7 @@
           <a:p>
             <a:fld id="{48A87A34-81AB-432B-8DAE-1953F412C126}" type="datetimeFigureOut">
               <a:rPr lang="en-US" dirty="0"/>
-              <a:t>10/19/2019</a:t>
+              <a:t>11/5/2019</a:t>
             </a:fld>
             <a:endParaRPr lang="en-US" dirty="0"/>
           </a:p>
@@ -4326,7 +4327,7 @@
           <a:p>
             <a:fld id="{48A87A34-81AB-432B-8DAE-1953F412C126}" type="datetimeFigureOut">
               <a:rPr lang="en-US" dirty="0"/>
-              <a:t>10/19/2019</a:t>
+              <a:t>11/5/2019</a:t>
             </a:fld>
             <a:endParaRPr lang="en-US" dirty="0"/>
           </a:p>
@@ -4439,7 +4440,7 @@
           <a:p>
             <a:fld id="{48A87A34-81AB-432B-8DAE-1953F412C126}" type="datetimeFigureOut">
               <a:rPr lang="en-US" dirty="0"/>
-              <a:t>10/19/2019</a:t>
+              <a:t>11/5/2019</a:t>
             </a:fld>
             <a:endParaRPr lang="en-US" dirty="0"/>
           </a:p>
@@ -4529,7 +4530,7 @@
           <a:p>
             <a:fld id="{48A87A34-81AB-432B-8DAE-1953F412C126}" type="datetimeFigureOut">
               <a:rPr lang="en-US" dirty="0"/>
-              <a:t>10/19/2019</a:t>
+              <a:t>11/5/2019</a:t>
             </a:fld>
             <a:endParaRPr lang="en-US" dirty="0"/>
           </a:p>
@@ -4773,7 +4774,7 @@
           <a:p>
             <a:fld id="{48A87A34-81AB-432B-8DAE-1953F412C126}" type="datetimeFigureOut">
               <a:rPr lang="en-US" dirty="0"/>
-              <a:t>10/19/2019</a:t>
+              <a:t>11/5/2019</a:t>
             </a:fld>
             <a:endParaRPr lang="en-US" dirty="0"/>
           </a:p>
@@ -5025,7 +5026,7 @@
           <a:p>
             <a:fld id="{48A87A34-81AB-432B-8DAE-1953F412C126}" type="datetimeFigureOut">
               <a:rPr lang="en-US" dirty="0"/>
-              <a:t>10/19/2019</a:t>
+              <a:t>11/5/2019</a:t>
             </a:fld>
             <a:endParaRPr lang="en-US" dirty="0"/>
           </a:p>
@@ -5264,7 +5265,7 @@
             <a:fld id="{48A87A34-81AB-432B-8DAE-1953F412C126}" type="datetimeFigureOut">
               <a:rPr lang="en-US" dirty="0"/>
               <a:pPr/>
-              <a:t>10/19/2019</a:t>
+              <a:t>11/5/2019</a:t>
             </a:fld>
             <a:endParaRPr lang="en-US" dirty="0"/>
           </a:p>
@@ -6040,6 +6041,537 @@
 </p:sld>
 </file>
 
+<file path=ppt/slides/slide11.xml><?xml version="1.0" encoding="utf-8"?>
+<p:sld xmlns:a="http://schemas.openxmlformats.org/drawingml/2006/main" xmlns:r="http://schemas.openxmlformats.org/officeDocument/2006/relationships" xmlns:p="http://schemas.openxmlformats.org/presentationml/2006/main">
+  <p:cSld>
+    <p:spTree>
+      <p:nvGrpSpPr>
+        <p:cNvPr id="1" name=""/>
+        <p:cNvGrpSpPr/>
+        <p:nvPr/>
+      </p:nvGrpSpPr>
+      <p:grpSpPr>
+        <a:xfrm>
+          <a:off x="0" y="0"/>
+          <a:ext cx="0" cy="0"/>
+          <a:chOff x="0" y="0"/>
+          <a:chExt cx="0" cy="0"/>
+        </a:xfrm>
+      </p:grpSpPr>
+      <p:sp>
+        <p:nvSpPr>
+          <p:cNvPr id="2" name="Title 1">
+            <a:extLst>
+              <a:ext uri="{FF2B5EF4-FFF2-40B4-BE49-F238E27FC236}">
+                <a16:creationId xmlns:a16="http://schemas.microsoft.com/office/drawing/2014/main" id="{B5309320-C76B-46F4-BD0B-88A8B49717E4}"/>
+              </a:ext>
+            </a:extLst>
+          </p:cNvPr>
+          <p:cNvSpPr>
+            <a:spLocks noGrp="1"/>
+          </p:cNvSpPr>
+          <p:nvPr>
+            <p:ph type="title"/>
+          </p:nvPr>
+        </p:nvSpPr>
+        <p:spPr/>
+        <p:txBody>
+          <a:bodyPr/>
+          <a:lstStyle/>
+          <a:p>
+            <a:r>
+              <a:rPr lang="en-US" dirty="0"/>
+              <a:t>Trouble shoot guide</a:t>
+            </a:r>
+          </a:p>
+        </p:txBody>
+      </p:sp>
+      <p:sp>
+        <p:nvSpPr>
+          <p:cNvPr id="3" name="Content Placeholder 2">
+            <a:extLst>
+              <a:ext uri="{FF2B5EF4-FFF2-40B4-BE49-F238E27FC236}">
+                <a16:creationId xmlns:a16="http://schemas.microsoft.com/office/drawing/2014/main" id="{03C60A1F-C8FE-4A72-82C9-C354CAB14BF2}"/>
+              </a:ext>
+            </a:extLst>
+          </p:cNvPr>
+          <p:cNvSpPr>
+            <a:spLocks noGrp="1"/>
+          </p:cNvSpPr>
+          <p:nvPr>
+            <p:ph idx="1"/>
+          </p:nvPr>
+        </p:nvSpPr>
+        <p:spPr/>
+        <p:txBody>
+          <a:bodyPr/>
+          <a:lstStyle/>
+          <a:p>
+            <a:r>
+              <a:rPr lang="en-US" dirty="0"/>
+              <a:t>MMC Init Fails</a:t>
+            </a:r>
+          </a:p>
+          <a:p>
+            <a:pPr lvl="1"/>
+            <a:r>
+              <a:rPr lang="en-US" altLang="en-US" dirty="0">
+                <a:solidFill>
+                  <a:srgbClr val="242729"/>
+                </a:solidFill>
+                <a:latin typeface="Arial" panose="020B0604020202020204" pitchFamily="34" charset="0"/>
+                <a:cs typeface="Arial" panose="020B0604020202020204" pitchFamily="34" charset="0"/>
+              </a:rPr>
+              <a:t>I know this question is relatively old but still, if you </a:t>
+            </a:r>
+            <a:r>
+              <a:rPr lang="en-US" altLang="en-US" dirty="0" err="1">
+                <a:solidFill>
+                  <a:srgbClr val="242729"/>
+                </a:solidFill>
+                <a:latin typeface="Arial" panose="020B0604020202020204" pitchFamily="34" charset="0"/>
+                <a:cs typeface="Arial" panose="020B0604020202020204" pitchFamily="34" charset="0"/>
+              </a:rPr>
+              <a:t>wnat</a:t>
+            </a:r>
+            <a:r>
+              <a:rPr lang="en-US" altLang="en-US" dirty="0">
+                <a:solidFill>
+                  <a:srgbClr val="242729"/>
+                </a:solidFill>
+                <a:latin typeface="Arial" panose="020B0604020202020204" pitchFamily="34" charset="0"/>
+                <a:cs typeface="Arial" panose="020B0604020202020204" pitchFamily="34" charset="0"/>
+              </a:rPr>
+              <a:t> to run </a:t>
+            </a:r>
+            <a:r>
+              <a:rPr lang="en-US" altLang="en-US" sz="1400" dirty="0" err="1">
+                <a:solidFill>
+                  <a:srgbClr val="242729"/>
+                </a:solidFill>
+                <a:latin typeface="Consolas" panose="020B0609020204030204" pitchFamily="49" charset="0"/>
+              </a:rPr>
+              <a:t>SD.begin</a:t>
+            </a:r>
+            <a:r>
+              <a:rPr lang="en-US" altLang="en-US" sz="1400" dirty="0">
+                <a:solidFill>
+                  <a:srgbClr val="242729"/>
+                </a:solidFill>
+                <a:latin typeface="Consolas" panose="020B0609020204030204" pitchFamily="49" charset="0"/>
+              </a:rPr>
+              <a:t>(</a:t>
+            </a:r>
+            <a:r>
+              <a:rPr lang="en-US" altLang="en-US" sz="1400" dirty="0" err="1">
+                <a:solidFill>
+                  <a:srgbClr val="242729"/>
+                </a:solidFill>
+                <a:latin typeface="Consolas" panose="020B0609020204030204" pitchFamily="49" charset="0"/>
+              </a:rPr>
+              <a:t>chipselect</a:t>
+            </a:r>
+            <a:r>
+              <a:rPr lang="en-US" altLang="en-US" sz="1400" dirty="0">
+                <a:solidFill>
+                  <a:srgbClr val="242729"/>
+                </a:solidFill>
+                <a:latin typeface="Consolas" panose="020B0609020204030204" pitchFamily="49" charset="0"/>
+              </a:rPr>
+              <a:t>);</a:t>
+            </a:r>
+            <a:r>
+              <a:rPr lang="en-US" altLang="en-US" dirty="0">
+                <a:solidFill>
+                  <a:srgbClr val="242729"/>
+                </a:solidFill>
+                <a:latin typeface="Arial" panose="020B0604020202020204" pitchFamily="34" charset="0"/>
+                <a:cs typeface="Arial" panose="020B0604020202020204" pitchFamily="34" charset="0"/>
+              </a:rPr>
+              <a:t> again first call </a:t>
+            </a:r>
+            <a:r>
+              <a:rPr lang="en-US" altLang="en-US" sz="1400" dirty="0">
+                <a:solidFill>
+                  <a:srgbClr val="242729"/>
+                </a:solidFill>
+                <a:latin typeface="Consolas" panose="020B0609020204030204" pitchFamily="49" charset="0"/>
+              </a:rPr>
+              <a:t>if(</a:t>
+            </a:r>
+            <a:r>
+              <a:rPr lang="en-US" altLang="en-US" sz="1400" dirty="0" err="1">
+                <a:solidFill>
+                  <a:srgbClr val="242729"/>
+                </a:solidFill>
+                <a:latin typeface="Consolas" panose="020B0609020204030204" pitchFamily="49" charset="0"/>
+              </a:rPr>
+              <a:t>root.isOpen</a:t>
+            </a:r>
+            <a:r>
+              <a:rPr lang="en-US" altLang="en-US" sz="1400" dirty="0">
+                <a:solidFill>
+                  <a:srgbClr val="242729"/>
+                </a:solidFill>
+                <a:latin typeface="Consolas" panose="020B0609020204030204" pitchFamily="49" charset="0"/>
+              </a:rPr>
+              <a:t>()) </a:t>
+            </a:r>
+            <a:r>
+              <a:rPr lang="en-US" altLang="en-US" sz="1400" dirty="0" err="1">
+                <a:solidFill>
+                  <a:srgbClr val="242729"/>
+                </a:solidFill>
+                <a:latin typeface="Consolas" panose="020B0609020204030204" pitchFamily="49" charset="0"/>
+              </a:rPr>
+              <a:t>root.close</a:t>
+            </a:r>
+            <a:r>
+              <a:rPr lang="en-US" altLang="en-US" sz="1400" dirty="0">
+                <a:solidFill>
+                  <a:srgbClr val="242729"/>
+                </a:solidFill>
+                <a:latin typeface="Consolas" panose="020B0609020204030204" pitchFamily="49" charset="0"/>
+              </a:rPr>
+              <a:t>();</a:t>
+            </a:r>
+            <a:r>
+              <a:rPr lang="en-US" altLang="en-US" dirty="0">
+                <a:solidFill>
+                  <a:srgbClr val="242729"/>
+                </a:solidFill>
+                <a:latin typeface="Arial" panose="020B0604020202020204" pitchFamily="34" charset="0"/>
+                <a:cs typeface="Arial" panose="020B0604020202020204" pitchFamily="34" charset="0"/>
+              </a:rPr>
+              <a:t> I added this to the library. This way </a:t>
+            </a:r>
+            <a:r>
+              <a:rPr lang="en-US" altLang="en-US" sz="1400" dirty="0" err="1">
+                <a:solidFill>
+                  <a:srgbClr val="242729"/>
+                </a:solidFill>
+                <a:latin typeface="Consolas" panose="020B0609020204030204" pitchFamily="49" charset="0"/>
+              </a:rPr>
+              <a:t>SD.begin</a:t>
+            </a:r>
+            <a:r>
+              <a:rPr lang="en-US" altLang="en-US" sz="1400" dirty="0">
+                <a:solidFill>
+                  <a:srgbClr val="242729"/>
+                </a:solidFill>
+                <a:latin typeface="Consolas" panose="020B0609020204030204" pitchFamily="49" charset="0"/>
+              </a:rPr>
+              <a:t>(</a:t>
+            </a:r>
+            <a:r>
+              <a:rPr lang="en-US" altLang="en-US" sz="1400" dirty="0" err="1">
+                <a:solidFill>
+                  <a:srgbClr val="242729"/>
+                </a:solidFill>
+                <a:latin typeface="Consolas" panose="020B0609020204030204" pitchFamily="49" charset="0"/>
+              </a:rPr>
+              <a:t>chipselect</a:t>
+            </a:r>
+            <a:r>
+              <a:rPr lang="en-US" altLang="en-US" sz="1400" dirty="0">
+                <a:solidFill>
+                  <a:srgbClr val="242729"/>
+                </a:solidFill>
+                <a:latin typeface="Consolas" panose="020B0609020204030204" pitchFamily="49" charset="0"/>
+              </a:rPr>
+              <a:t>)</a:t>
+            </a:r>
+            <a:r>
+              <a:rPr lang="en-US" altLang="en-US" dirty="0">
+                <a:solidFill>
+                  <a:srgbClr val="242729"/>
+                </a:solidFill>
+                <a:latin typeface="Arial" panose="020B0604020202020204" pitchFamily="34" charset="0"/>
+                <a:cs typeface="Arial" panose="020B0604020202020204" pitchFamily="34" charset="0"/>
+              </a:rPr>
+              <a:t> will return </a:t>
+            </a:r>
+            <a:r>
+              <a:rPr lang="en-US" altLang="en-US" sz="1400" dirty="0">
+                <a:solidFill>
+                  <a:srgbClr val="242729"/>
+                </a:solidFill>
+                <a:latin typeface="Consolas" panose="020B0609020204030204" pitchFamily="49" charset="0"/>
+              </a:rPr>
+              <a:t>true</a:t>
+            </a:r>
+            <a:r>
+              <a:rPr lang="en-US" altLang="en-US" dirty="0">
+                <a:solidFill>
+                  <a:srgbClr val="242729"/>
+                </a:solidFill>
+                <a:latin typeface="Arial" panose="020B0604020202020204" pitchFamily="34" charset="0"/>
+                <a:cs typeface="Arial" panose="020B0604020202020204" pitchFamily="34" charset="0"/>
+              </a:rPr>
+              <a:t> if a card is present and </a:t>
+            </a:r>
+            <a:r>
+              <a:rPr lang="en-US" altLang="en-US" sz="1400" dirty="0">
+                <a:solidFill>
+                  <a:srgbClr val="242729"/>
+                </a:solidFill>
+                <a:latin typeface="Consolas" panose="020B0609020204030204" pitchFamily="49" charset="0"/>
+              </a:rPr>
+              <a:t>false</a:t>
+            </a:r>
+            <a:r>
+              <a:rPr lang="en-US" altLang="en-US" dirty="0">
+                <a:solidFill>
+                  <a:srgbClr val="242729"/>
+                </a:solidFill>
+                <a:latin typeface="Arial" panose="020B0604020202020204" pitchFamily="34" charset="0"/>
+                <a:cs typeface="Arial" panose="020B0604020202020204" pitchFamily="34" charset="0"/>
+              </a:rPr>
+              <a:t> when it's not.</a:t>
+            </a:r>
+            <a:r>
+              <a:rPr lang="en-US" altLang="en-US" sz="1200" dirty="0"/>
+              <a:t> </a:t>
+            </a:r>
+            <a:endParaRPr lang="en-US" altLang="en-US" sz="3600" dirty="0">
+              <a:latin typeface="Arial" panose="020B0604020202020204" pitchFamily="34" charset="0"/>
+            </a:endParaRPr>
+          </a:p>
+          <a:p>
+            <a:pPr lvl="1"/>
+            <a:endParaRPr lang="en-US" dirty="0"/>
+          </a:p>
+        </p:txBody>
+      </p:sp>
+      <p:sp>
+        <p:nvSpPr>
+          <p:cNvPr id="4" name="Rectangle 1">
+            <a:extLst>
+              <a:ext uri="{FF2B5EF4-FFF2-40B4-BE49-F238E27FC236}">
+                <a16:creationId xmlns:a16="http://schemas.microsoft.com/office/drawing/2014/main" id="{31D43E2C-9386-42F5-B85B-63A61B9574F8}"/>
+              </a:ext>
+            </a:extLst>
+          </p:cNvPr>
+          <p:cNvSpPr>
+            <a:spLocks noChangeArrowheads="1"/>
+          </p:cNvSpPr>
+          <p:nvPr/>
+        </p:nvSpPr>
+        <p:spPr bwMode="auto">
+          <a:xfrm>
+            <a:off x="0" y="-138499"/>
+            <a:ext cx="65" cy="276999"/>
+          </a:xfrm>
+          <a:prstGeom prst="rect">
+            <a:avLst/>
+          </a:prstGeom>
+          <a:solidFill>
+            <a:srgbClr val="EFF0F1"/>
+          </a:solidFill>
+          <a:ln>
+            <a:noFill/>
+          </a:ln>
+          <a:effectLst/>
+          <a:extLst>
+            <a:ext uri="{91240B29-F687-4F45-9708-019B960494DF}">
+              <a14:hiddenLine xmlns:a14="http://schemas.microsoft.com/office/drawing/2010/main" w="9525">
+                <a:solidFill>
+                  <a:schemeClr val="tx1"/>
+                </a:solidFill>
+                <a:miter lim="800000"/>
+                <a:headEnd/>
+                <a:tailEnd/>
+              </a14:hiddenLine>
+            </a:ext>
+            <a:ext uri="{AF507438-7753-43E0-B8FC-AC1667EBCBE1}">
+              <a14:hiddenEffects xmlns:a14="http://schemas.microsoft.com/office/drawing/2010/main">
+                <a:effectLst>
+                  <a:outerShdw dist="35921" dir="2700000" algn="ctr" rotWithShape="0">
+                    <a:schemeClr val="bg2"/>
+                  </a:outerShdw>
+                </a:effectLst>
+              </a14:hiddenEffects>
+            </a:ext>
+          </a:extLst>
+        </p:spPr>
+        <p:txBody>
+          <a:bodyPr vert="horz" wrap="none" lIns="0" tIns="0" rIns="0" bIns="0" numCol="1" anchor="ctr" anchorCtr="0" compatLnSpc="1">
+            <a:prstTxWarp prst="textNoShape">
+              <a:avLst/>
+            </a:prstTxWarp>
+            <a:spAutoFit/>
+          </a:bodyPr>
+          <a:lstStyle>
+            <a:lvl1pPr eaLnBrk="0" fontAlgn="base" hangingPunct="0">
+              <a:spcBef>
+                <a:spcPct val="0"/>
+              </a:spcBef>
+              <a:spcAft>
+                <a:spcPct val="0"/>
+              </a:spcAft>
+              <a:defRPr>
+                <a:solidFill>
+                  <a:schemeClr val="tx1"/>
+                </a:solidFill>
+                <a:latin typeface="Arial" panose="020B0604020202020204" pitchFamily="34" charset="0"/>
+              </a:defRPr>
+            </a:lvl1pPr>
+            <a:lvl2pPr eaLnBrk="0" fontAlgn="base" hangingPunct="0">
+              <a:spcBef>
+                <a:spcPct val="0"/>
+              </a:spcBef>
+              <a:spcAft>
+                <a:spcPct val="0"/>
+              </a:spcAft>
+              <a:defRPr>
+                <a:solidFill>
+                  <a:schemeClr val="tx1"/>
+                </a:solidFill>
+                <a:latin typeface="Arial" panose="020B0604020202020204" pitchFamily="34" charset="0"/>
+              </a:defRPr>
+            </a:lvl2pPr>
+            <a:lvl3pPr eaLnBrk="0" fontAlgn="base" hangingPunct="0">
+              <a:spcBef>
+                <a:spcPct val="0"/>
+              </a:spcBef>
+              <a:spcAft>
+                <a:spcPct val="0"/>
+              </a:spcAft>
+              <a:defRPr>
+                <a:solidFill>
+                  <a:schemeClr val="tx1"/>
+                </a:solidFill>
+                <a:latin typeface="Arial" panose="020B0604020202020204" pitchFamily="34" charset="0"/>
+              </a:defRPr>
+            </a:lvl3pPr>
+            <a:lvl4pPr eaLnBrk="0" fontAlgn="base" hangingPunct="0">
+              <a:spcBef>
+                <a:spcPct val="0"/>
+              </a:spcBef>
+              <a:spcAft>
+                <a:spcPct val="0"/>
+              </a:spcAft>
+              <a:defRPr>
+                <a:solidFill>
+                  <a:schemeClr val="tx1"/>
+                </a:solidFill>
+                <a:latin typeface="Arial" panose="020B0604020202020204" pitchFamily="34" charset="0"/>
+              </a:defRPr>
+            </a:lvl4pPr>
+            <a:lvl5pPr eaLnBrk="0" fontAlgn="base" hangingPunct="0">
+              <a:spcBef>
+                <a:spcPct val="0"/>
+              </a:spcBef>
+              <a:spcAft>
+                <a:spcPct val="0"/>
+              </a:spcAft>
+              <a:defRPr>
+                <a:solidFill>
+                  <a:schemeClr val="tx1"/>
+                </a:solidFill>
+                <a:latin typeface="Arial" panose="020B0604020202020204" pitchFamily="34" charset="0"/>
+              </a:defRPr>
+            </a:lvl5pPr>
+            <a:lvl6pPr eaLnBrk="0" fontAlgn="base" hangingPunct="0">
+              <a:spcBef>
+                <a:spcPct val="0"/>
+              </a:spcBef>
+              <a:spcAft>
+                <a:spcPct val="0"/>
+              </a:spcAft>
+              <a:defRPr>
+                <a:solidFill>
+                  <a:schemeClr val="tx1"/>
+                </a:solidFill>
+                <a:latin typeface="Arial" panose="020B0604020202020204" pitchFamily="34" charset="0"/>
+              </a:defRPr>
+            </a:lvl6pPr>
+            <a:lvl7pPr eaLnBrk="0" fontAlgn="base" hangingPunct="0">
+              <a:spcBef>
+                <a:spcPct val="0"/>
+              </a:spcBef>
+              <a:spcAft>
+                <a:spcPct val="0"/>
+              </a:spcAft>
+              <a:defRPr>
+                <a:solidFill>
+                  <a:schemeClr val="tx1"/>
+                </a:solidFill>
+                <a:latin typeface="Arial" panose="020B0604020202020204" pitchFamily="34" charset="0"/>
+              </a:defRPr>
+            </a:lvl7pPr>
+            <a:lvl8pPr eaLnBrk="0" fontAlgn="base" hangingPunct="0">
+              <a:spcBef>
+                <a:spcPct val="0"/>
+              </a:spcBef>
+              <a:spcAft>
+                <a:spcPct val="0"/>
+              </a:spcAft>
+              <a:defRPr>
+                <a:solidFill>
+                  <a:schemeClr val="tx1"/>
+                </a:solidFill>
+                <a:latin typeface="Arial" panose="020B0604020202020204" pitchFamily="34" charset="0"/>
+              </a:defRPr>
+            </a:lvl8pPr>
+            <a:lvl9pPr eaLnBrk="0" fontAlgn="base" hangingPunct="0">
+              <a:spcBef>
+                <a:spcPct val="0"/>
+              </a:spcBef>
+              <a:spcAft>
+                <a:spcPct val="0"/>
+              </a:spcAft>
+              <a:defRPr>
+                <a:solidFill>
+                  <a:schemeClr val="tx1"/>
+                </a:solidFill>
+                <a:latin typeface="Arial" panose="020B0604020202020204" pitchFamily="34" charset="0"/>
+              </a:defRPr>
+            </a:lvl9pPr>
+          </a:lstStyle>
+          <a:p>
+            <a:pPr marL="0" marR="0" lvl="0" indent="0" algn="l" defTabSz="914400" rtl="0" eaLnBrk="0" fontAlgn="base" latinLnBrk="0" hangingPunct="0">
+              <a:lnSpc>
+                <a:spcPct val="100000"/>
+              </a:lnSpc>
+              <a:spcBef>
+                <a:spcPct val="0"/>
+              </a:spcBef>
+              <a:spcAft>
+                <a:spcPct val="0"/>
+              </a:spcAft>
+              <a:buClrTx/>
+              <a:buSzTx/>
+              <a:buFontTx/>
+              <a:buNone/>
+              <a:tabLst/>
+            </a:pPr>
+            <a:endParaRPr kumimoji="0" lang="en-US" altLang="en-US" sz="1800" b="0" i="0" u="none" strike="noStrike" cap="none" normalizeH="0" baseline="0" dirty="0">
+              <a:ln>
+                <a:noFill/>
+              </a:ln>
+              <a:solidFill>
+                <a:schemeClr val="tx1"/>
+              </a:solidFill>
+              <a:effectLst/>
+              <a:latin typeface="Arial" panose="020B0604020202020204" pitchFamily="34" charset="0"/>
+            </a:endParaRPr>
+          </a:p>
+        </p:txBody>
+      </p:sp>
+    </p:spTree>
+    <p:extLst>
+      <p:ext uri="{BB962C8B-B14F-4D97-AF65-F5344CB8AC3E}">
+        <p14:creationId xmlns:p14="http://schemas.microsoft.com/office/powerpoint/2010/main" val="492731755"/>
+      </p:ext>
+    </p:extLst>
+  </p:cSld>
+  <p:clrMapOvr>
+    <a:masterClrMapping/>
+  </p:clrMapOvr>
+</p:sld>
+</file>
+
 <file path=ppt/slides/slide2.xml><?xml version="1.0" encoding="utf-8"?>
 <p:sld xmlns:a="http://schemas.openxmlformats.org/drawingml/2006/main" xmlns:r="http://schemas.openxmlformats.org/officeDocument/2006/relationships" xmlns:p="http://schemas.openxmlformats.org/presentationml/2006/main">
   <p:cSld>

</xml_diff>